<commit_message>
New Fig (and revised 1 fig) to vectors lab
</commit_message>
<xml_diff>
--- a/StudentGuideModule1/vectors/vectors_fig_new.pptx
+++ b/StudentGuideModule1/vectors/vectors_fig_new.pptx
@@ -5,10 +5,11 @@
     <p:sldMasterId id="2147483648" r:id="rId1"/>
   </p:sldMasterIdLst>
   <p:sldIdLst>
-    <p:sldId id="256" r:id="rId2"/>
+    <p:sldId id="260" r:id="rId2"/>
+    <p:sldId id="258" r:id="rId3"/>
   </p:sldIdLst>
   <p:sldSz cx="12192000" cy="6858000"/>
-  <p:notesSz cx="6858000" cy="9144000"/>
+  <p:notesSz cx="7010400" cy="9296400"/>
   <p:defaultTextStyle>
     <a:defPPr>
       <a:defRPr lang="en-US"/>
@@ -104,6 +105,11 @@
       </a:defRPr>
     </a:lvl9pPr>
   </p:defaultTextStyle>
+  <p:extLst>
+    <p:ext uri="{EFAFB233-063F-42B5-8137-9DF3F51BA10A}">
+      <p15:sldGuideLst xmlns:p15="http://schemas.microsoft.com/office/powerpoint/2012/main"/>
+    </p:ext>
+  </p:extLst>
 </p:presentation>
 </file>
 
@@ -149,10 +155,9 @@
           </a:lstStyle>
           <a:p>
             <a:r>
-              <a:rPr lang="en-US" smtClean="0"/>
+              <a:rPr lang="en-US"/>
               <a:t>Click to edit Master title style</a:t>
             </a:r>
-            <a:endParaRPr lang="en-US"/>
           </a:p>
         </p:txBody>
       </p:sp>
@@ -214,10 +219,9 @@
           </a:lstStyle>
           <a:p>
             <a:r>
-              <a:rPr lang="en-US" smtClean="0"/>
+              <a:rPr lang="en-US"/>
               <a:t>Click to edit Master subtitle style</a:t>
             </a:r>
-            <a:endParaRPr lang="en-US"/>
           </a:p>
         </p:txBody>
       </p:sp>
@@ -238,7 +242,7 @@
           <a:p>
             <a:fld id="{5E08F899-8669-4B52-BC52-DF490937ED14}" type="datetimeFigureOut">
               <a:rPr lang="en-US" smtClean="0"/>
-              <a:t>5/20/2016</a:t>
+              <a:t>9/15/2022</a:t>
             </a:fld>
             <a:endParaRPr lang="en-US"/>
           </a:p>
@@ -332,10 +336,9 @@
           <a:lstStyle/>
           <a:p>
             <a:r>
-              <a:rPr lang="en-US" smtClean="0"/>
+              <a:rPr lang="en-US"/>
               <a:t>Click to edit Master title style</a:t>
             </a:r>
-            <a:endParaRPr lang="en-US"/>
           </a:p>
         </p:txBody>
       </p:sp>
@@ -356,38 +359,37 @@
           <a:p>
             <a:pPr lvl="0"/>
             <a:r>
-              <a:rPr lang="en-US" smtClean="0"/>
+              <a:rPr lang="en-US"/>
               <a:t>Edit Master text styles</a:t>
             </a:r>
           </a:p>
           <a:p>
             <a:pPr lvl="1"/>
             <a:r>
-              <a:rPr lang="en-US" smtClean="0"/>
+              <a:rPr lang="en-US"/>
               <a:t>Second level</a:t>
             </a:r>
           </a:p>
           <a:p>
             <a:pPr lvl="2"/>
             <a:r>
-              <a:rPr lang="en-US" smtClean="0"/>
+              <a:rPr lang="en-US"/>
               <a:t>Third level</a:t>
             </a:r>
           </a:p>
           <a:p>
             <a:pPr lvl="3"/>
             <a:r>
-              <a:rPr lang="en-US" smtClean="0"/>
+              <a:rPr lang="en-US"/>
               <a:t>Fourth level</a:t>
             </a:r>
           </a:p>
           <a:p>
             <a:pPr lvl="4"/>
             <a:r>
-              <a:rPr lang="en-US" smtClean="0"/>
+              <a:rPr lang="en-US"/>
               <a:t>Fifth level</a:t>
             </a:r>
-            <a:endParaRPr lang="en-US"/>
           </a:p>
         </p:txBody>
       </p:sp>
@@ -408,7 +410,7 @@
           <a:p>
             <a:fld id="{5E08F899-8669-4B52-BC52-DF490937ED14}" type="datetimeFigureOut">
               <a:rPr lang="en-US" smtClean="0"/>
-              <a:t>5/20/2016</a:t>
+              <a:t>9/15/2022</a:t>
             </a:fld>
             <a:endParaRPr lang="en-US"/>
           </a:p>
@@ -507,10 +509,9 @@
           <a:lstStyle/>
           <a:p>
             <a:r>
-              <a:rPr lang="en-US" smtClean="0"/>
+              <a:rPr lang="en-US"/>
               <a:t>Click to edit Master title style</a:t>
             </a:r>
-            <a:endParaRPr lang="en-US"/>
           </a:p>
         </p:txBody>
       </p:sp>
@@ -536,38 +537,37 @@
           <a:p>
             <a:pPr lvl="0"/>
             <a:r>
-              <a:rPr lang="en-US" smtClean="0"/>
+              <a:rPr lang="en-US"/>
               <a:t>Edit Master text styles</a:t>
             </a:r>
           </a:p>
           <a:p>
             <a:pPr lvl="1"/>
             <a:r>
-              <a:rPr lang="en-US" smtClean="0"/>
+              <a:rPr lang="en-US"/>
               <a:t>Second level</a:t>
             </a:r>
           </a:p>
           <a:p>
             <a:pPr lvl="2"/>
             <a:r>
-              <a:rPr lang="en-US" smtClean="0"/>
+              <a:rPr lang="en-US"/>
               <a:t>Third level</a:t>
             </a:r>
           </a:p>
           <a:p>
             <a:pPr lvl="3"/>
             <a:r>
-              <a:rPr lang="en-US" smtClean="0"/>
+              <a:rPr lang="en-US"/>
               <a:t>Fourth level</a:t>
             </a:r>
           </a:p>
           <a:p>
             <a:pPr lvl="4"/>
             <a:r>
-              <a:rPr lang="en-US" smtClean="0"/>
+              <a:rPr lang="en-US"/>
               <a:t>Fifth level</a:t>
             </a:r>
-            <a:endParaRPr lang="en-US"/>
           </a:p>
         </p:txBody>
       </p:sp>
@@ -588,7 +588,7 @@
           <a:p>
             <a:fld id="{5E08F899-8669-4B52-BC52-DF490937ED14}" type="datetimeFigureOut">
               <a:rPr lang="en-US" smtClean="0"/>
-              <a:t>5/20/2016</a:t>
+              <a:t>9/15/2022</a:t>
             </a:fld>
             <a:endParaRPr lang="en-US"/>
           </a:p>
@@ -682,10 +682,9 @@
           <a:lstStyle/>
           <a:p>
             <a:r>
-              <a:rPr lang="en-US" smtClean="0"/>
+              <a:rPr lang="en-US"/>
               <a:t>Click to edit Master title style</a:t>
             </a:r>
-            <a:endParaRPr lang="en-US"/>
           </a:p>
         </p:txBody>
       </p:sp>
@@ -706,38 +705,37 @@
           <a:p>
             <a:pPr lvl="0"/>
             <a:r>
-              <a:rPr lang="en-US" smtClean="0"/>
+              <a:rPr lang="en-US"/>
               <a:t>Edit Master text styles</a:t>
             </a:r>
           </a:p>
           <a:p>
             <a:pPr lvl="1"/>
             <a:r>
-              <a:rPr lang="en-US" smtClean="0"/>
+              <a:rPr lang="en-US"/>
               <a:t>Second level</a:t>
             </a:r>
           </a:p>
           <a:p>
             <a:pPr lvl="2"/>
             <a:r>
-              <a:rPr lang="en-US" smtClean="0"/>
+              <a:rPr lang="en-US"/>
               <a:t>Third level</a:t>
             </a:r>
           </a:p>
           <a:p>
             <a:pPr lvl="3"/>
             <a:r>
-              <a:rPr lang="en-US" smtClean="0"/>
+              <a:rPr lang="en-US"/>
               <a:t>Fourth level</a:t>
             </a:r>
           </a:p>
           <a:p>
             <a:pPr lvl="4"/>
             <a:r>
-              <a:rPr lang="en-US" smtClean="0"/>
+              <a:rPr lang="en-US"/>
               <a:t>Fifth level</a:t>
             </a:r>
-            <a:endParaRPr lang="en-US"/>
           </a:p>
         </p:txBody>
       </p:sp>
@@ -758,7 +756,7 @@
           <a:p>
             <a:fld id="{5E08F899-8669-4B52-BC52-DF490937ED14}" type="datetimeFigureOut">
               <a:rPr lang="en-US" smtClean="0"/>
-              <a:t>5/20/2016</a:t>
+              <a:t>9/15/2022</a:t>
             </a:fld>
             <a:endParaRPr lang="en-US"/>
           </a:p>
@@ -861,10 +859,9 @@
           </a:lstStyle>
           <a:p>
             <a:r>
-              <a:rPr lang="en-US" smtClean="0"/>
+              <a:rPr lang="en-US"/>
               <a:t>Click to edit Master title style</a:t>
             </a:r>
-            <a:endParaRPr lang="en-US"/>
           </a:p>
         </p:txBody>
       </p:sp>
@@ -981,7 +978,7 @@
           <a:p>
             <a:pPr lvl="0"/>
             <a:r>
-              <a:rPr lang="en-US" smtClean="0"/>
+              <a:rPr lang="en-US"/>
               <a:t>Edit Master text styles</a:t>
             </a:r>
           </a:p>
@@ -1004,7 +1001,7 @@
           <a:p>
             <a:fld id="{5E08F899-8669-4B52-BC52-DF490937ED14}" type="datetimeFigureOut">
               <a:rPr lang="en-US" smtClean="0"/>
-              <a:t>5/20/2016</a:t>
+              <a:t>9/15/2022</a:t>
             </a:fld>
             <a:endParaRPr lang="en-US"/>
           </a:p>
@@ -1098,10 +1095,9 @@
           <a:lstStyle/>
           <a:p>
             <a:r>
-              <a:rPr lang="en-US" smtClean="0"/>
+              <a:rPr lang="en-US"/>
               <a:t>Click to edit Master title style</a:t>
             </a:r>
-            <a:endParaRPr lang="en-US"/>
           </a:p>
         </p:txBody>
       </p:sp>
@@ -1127,38 +1123,37 @@
           <a:p>
             <a:pPr lvl="0"/>
             <a:r>
-              <a:rPr lang="en-US" smtClean="0"/>
+              <a:rPr lang="en-US"/>
               <a:t>Edit Master text styles</a:t>
             </a:r>
           </a:p>
           <a:p>
             <a:pPr lvl="1"/>
             <a:r>
-              <a:rPr lang="en-US" smtClean="0"/>
+              <a:rPr lang="en-US"/>
               <a:t>Second level</a:t>
             </a:r>
           </a:p>
           <a:p>
             <a:pPr lvl="2"/>
             <a:r>
-              <a:rPr lang="en-US" smtClean="0"/>
+              <a:rPr lang="en-US"/>
               <a:t>Third level</a:t>
             </a:r>
           </a:p>
           <a:p>
             <a:pPr lvl="3"/>
             <a:r>
-              <a:rPr lang="en-US" smtClean="0"/>
+              <a:rPr lang="en-US"/>
               <a:t>Fourth level</a:t>
             </a:r>
           </a:p>
           <a:p>
             <a:pPr lvl="4"/>
             <a:r>
-              <a:rPr lang="en-US" smtClean="0"/>
+              <a:rPr lang="en-US"/>
               <a:t>Fifth level</a:t>
             </a:r>
-            <a:endParaRPr lang="en-US"/>
           </a:p>
         </p:txBody>
       </p:sp>
@@ -1184,38 +1179,37 @@
           <a:p>
             <a:pPr lvl="0"/>
             <a:r>
-              <a:rPr lang="en-US" smtClean="0"/>
+              <a:rPr lang="en-US"/>
               <a:t>Edit Master text styles</a:t>
             </a:r>
           </a:p>
           <a:p>
             <a:pPr lvl="1"/>
             <a:r>
-              <a:rPr lang="en-US" smtClean="0"/>
+              <a:rPr lang="en-US"/>
               <a:t>Second level</a:t>
             </a:r>
           </a:p>
           <a:p>
             <a:pPr lvl="2"/>
             <a:r>
-              <a:rPr lang="en-US" smtClean="0"/>
+              <a:rPr lang="en-US"/>
               <a:t>Third level</a:t>
             </a:r>
           </a:p>
           <a:p>
             <a:pPr lvl="3"/>
             <a:r>
-              <a:rPr lang="en-US" smtClean="0"/>
+              <a:rPr lang="en-US"/>
               <a:t>Fourth level</a:t>
             </a:r>
           </a:p>
           <a:p>
             <a:pPr lvl="4"/>
             <a:r>
-              <a:rPr lang="en-US" smtClean="0"/>
+              <a:rPr lang="en-US"/>
               <a:t>Fifth level</a:t>
             </a:r>
-            <a:endParaRPr lang="en-US"/>
           </a:p>
         </p:txBody>
       </p:sp>
@@ -1236,7 +1230,7 @@
           <a:p>
             <a:fld id="{5E08F899-8669-4B52-BC52-DF490937ED14}" type="datetimeFigureOut">
               <a:rPr lang="en-US" smtClean="0"/>
-              <a:t>5/20/2016</a:t>
+              <a:t>9/15/2022</a:t>
             </a:fld>
             <a:endParaRPr lang="en-US"/>
           </a:p>
@@ -1335,10 +1329,9 @@
           <a:lstStyle/>
           <a:p>
             <a:r>
-              <a:rPr lang="en-US" smtClean="0"/>
+              <a:rPr lang="en-US"/>
               <a:t>Click to edit Master title style</a:t>
             </a:r>
-            <a:endParaRPr lang="en-US"/>
           </a:p>
         </p:txBody>
       </p:sp>
@@ -1401,7 +1394,7 @@
           <a:p>
             <a:pPr lvl="0"/>
             <a:r>
-              <a:rPr lang="en-US" smtClean="0"/>
+              <a:rPr lang="en-US"/>
               <a:t>Edit Master text styles</a:t>
             </a:r>
           </a:p>
@@ -1429,38 +1422,37 @@
           <a:p>
             <a:pPr lvl="0"/>
             <a:r>
-              <a:rPr lang="en-US" smtClean="0"/>
+              <a:rPr lang="en-US"/>
               <a:t>Edit Master text styles</a:t>
             </a:r>
           </a:p>
           <a:p>
             <a:pPr lvl="1"/>
             <a:r>
-              <a:rPr lang="en-US" smtClean="0"/>
+              <a:rPr lang="en-US"/>
               <a:t>Second level</a:t>
             </a:r>
           </a:p>
           <a:p>
             <a:pPr lvl="2"/>
             <a:r>
-              <a:rPr lang="en-US" smtClean="0"/>
+              <a:rPr lang="en-US"/>
               <a:t>Third level</a:t>
             </a:r>
           </a:p>
           <a:p>
             <a:pPr lvl="3"/>
             <a:r>
-              <a:rPr lang="en-US" smtClean="0"/>
+              <a:rPr lang="en-US"/>
               <a:t>Fourth level</a:t>
             </a:r>
           </a:p>
           <a:p>
             <a:pPr lvl="4"/>
             <a:r>
-              <a:rPr lang="en-US" smtClean="0"/>
+              <a:rPr lang="en-US"/>
               <a:t>Fifth level</a:t>
             </a:r>
-            <a:endParaRPr lang="en-US"/>
           </a:p>
         </p:txBody>
       </p:sp>
@@ -1523,7 +1515,7 @@
           <a:p>
             <a:pPr lvl="0"/>
             <a:r>
-              <a:rPr lang="en-US" smtClean="0"/>
+              <a:rPr lang="en-US"/>
               <a:t>Edit Master text styles</a:t>
             </a:r>
           </a:p>
@@ -1551,38 +1543,37 @@
           <a:p>
             <a:pPr lvl="0"/>
             <a:r>
-              <a:rPr lang="en-US" smtClean="0"/>
+              <a:rPr lang="en-US"/>
               <a:t>Edit Master text styles</a:t>
             </a:r>
           </a:p>
           <a:p>
             <a:pPr lvl="1"/>
             <a:r>
-              <a:rPr lang="en-US" smtClean="0"/>
+              <a:rPr lang="en-US"/>
               <a:t>Second level</a:t>
             </a:r>
           </a:p>
           <a:p>
             <a:pPr lvl="2"/>
             <a:r>
-              <a:rPr lang="en-US" smtClean="0"/>
+              <a:rPr lang="en-US"/>
               <a:t>Third level</a:t>
             </a:r>
           </a:p>
           <a:p>
             <a:pPr lvl="3"/>
             <a:r>
-              <a:rPr lang="en-US" smtClean="0"/>
+              <a:rPr lang="en-US"/>
               <a:t>Fourth level</a:t>
             </a:r>
           </a:p>
           <a:p>
             <a:pPr lvl="4"/>
             <a:r>
-              <a:rPr lang="en-US" smtClean="0"/>
+              <a:rPr lang="en-US"/>
               <a:t>Fifth level</a:t>
             </a:r>
-            <a:endParaRPr lang="en-US"/>
           </a:p>
         </p:txBody>
       </p:sp>
@@ -1603,7 +1594,7 @@
           <a:p>
             <a:fld id="{5E08F899-8669-4B52-BC52-DF490937ED14}" type="datetimeFigureOut">
               <a:rPr lang="en-US" smtClean="0"/>
-              <a:t>5/20/2016</a:t>
+              <a:t>9/15/2022</a:t>
             </a:fld>
             <a:endParaRPr lang="en-US"/>
           </a:p>
@@ -1697,10 +1688,9 @@
           <a:lstStyle/>
           <a:p>
             <a:r>
-              <a:rPr lang="en-US" smtClean="0"/>
+              <a:rPr lang="en-US"/>
               <a:t>Click to edit Master title style</a:t>
             </a:r>
-            <a:endParaRPr lang="en-US"/>
           </a:p>
         </p:txBody>
       </p:sp>
@@ -1721,7 +1711,7 @@
           <a:p>
             <a:fld id="{5E08F899-8669-4B52-BC52-DF490937ED14}" type="datetimeFigureOut">
               <a:rPr lang="en-US" smtClean="0"/>
-              <a:t>5/20/2016</a:t>
+              <a:t>9/15/2022</a:t>
             </a:fld>
             <a:endParaRPr lang="en-US"/>
           </a:p>
@@ -1816,7 +1806,7 @@
           <a:p>
             <a:fld id="{5E08F899-8669-4B52-BC52-DF490937ED14}" type="datetimeFigureOut">
               <a:rPr lang="en-US" smtClean="0"/>
-              <a:t>5/20/2016</a:t>
+              <a:t>9/15/2022</a:t>
             </a:fld>
             <a:endParaRPr lang="en-US"/>
           </a:p>
@@ -1919,10 +1909,9 @@
           </a:lstStyle>
           <a:p>
             <a:r>
-              <a:rPr lang="en-US" smtClean="0"/>
+              <a:rPr lang="en-US"/>
               <a:t>Click to edit Master title style</a:t>
             </a:r>
-            <a:endParaRPr lang="en-US"/>
           </a:p>
         </p:txBody>
       </p:sp>
@@ -1976,38 +1965,37 @@
           <a:p>
             <a:pPr lvl="0"/>
             <a:r>
-              <a:rPr lang="en-US" smtClean="0"/>
+              <a:rPr lang="en-US"/>
               <a:t>Edit Master text styles</a:t>
             </a:r>
           </a:p>
           <a:p>
             <a:pPr lvl="1"/>
             <a:r>
-              <a:rPr lang="en-US" smtClean="0"/>
+              <a:rPr lang="en-US"/>
               <a:t>Second level</a:t>
             </a:r>
           </a:p>
           <a:p>
             <a:pPr lvl="2"/>
             <a:r>
-              <a:rPr lang="en-US" smtClean="0"/>
+              <a:rPr lang="en-US"/>
               <a:t>Third level</a:t>
             </a:r>
           </a:p>
           <a:p>
             <a:pPr lvl="3"/>
             <a:r>
-              <a:rPr lang="en-US" smtClean="0"/>
+              <a:rPr lang="en-US"/>
               <a:t>Fourth level</a:t>
             </a:r>
           </a:p>
           <a:p>
             <a:pPr lvl="4"/>
             <a:r>
-              <a:rPr lang="en-US" smtClean="0"/>
+              <a:rPr lang="en-US"/>
               <a:t>Fifth level</a:t>
             </a:r>
-            <a:endParaRPr lang="en-US"/>
           </a:p>
         </p:txBody>
       </p:sp>
@@ -2070,7 +2058,7 @@
           <a:p>
             <a:pPr lvl="0"/>
             <a:r>
-              <a:rPr lang="en-US" smtClean="0"/>
+              <a:rPr lang="en-US"/>
               <a:t>Edit Master text styles</a:t>
             </a:r>
           </a:p>
@@ -2093,7 +2081,7 @@
           <a:p>
             <a:fld id="{5E08F899-8669-4B52-BC52-DF490937ED14}" type="datetimeFigureOut">
               <a:rPr lang="en-US" smtClean="0"/>
-              <a:t>5/20/2016</a:t>
+              <a:t>9/15/2022</a:t>
             </a:fld>
             <a:endParaRPr lang="en-US"/>
           </a:p>
@@ -2196,10 +2184,9 @@
           </a:lstStyle>
           <a:p>
             <a:r>
-              <a:rPr lang="en-US" smtClean="0"/>
+              <a:rPr lang="en-US"/>
               <a:t>Click to edit Master title style</a:t>
             </a:r>
-            <a:endParaRPr lang="en-US"/>
           </a:p>
         </p:txBody>
       </p:sp>
@@ -2323,7 +2310,7 @@
           <a:p>
             <a:pPr lvl="0"/>
             <a:r>
-              <a:rPr lang="en-US" smtClean="0"/>
+              <a:rPr lang="en-US"/>
               <a:t>Edit Master text styles</a:t>
             </a:r>
           </a:p>
@@ -2346,7 +2333,7 @@
           <a:p>
             <a:fld id="{5E08F899-8669-4B52-BC52-DF490937ED14}" type="datetimeFigureOut">
               <a:rPr lang="en-US" smtClean="0"/>
-              <a:t>5/20/2016</a:t>
+              <a:t>9/15/2022</a:t>
             </a:fld>
             <a:endParaRPr lang="en-US"/>
           </a:p>
@@ -2455,10 +2442,9 @@
           <a:lstStyle/>
           <a:p>
             <a:r>
-              <a:rPr lang="en-US" smtClean="0"/>
+              <a:rPr lang="en-US"/>
               <a:t>Click to edit Master title style</a:t>
             </a:r>
-            <a:endParaRPr lang="en-US"/>
           </a:p>
         </p:txBody>
       </p:sp>
@@ -2489,38 +2475,37 @@
           <a:p>
             <a:pPr lvl="0"/>
             <a:r>
-              <a:rPr lang="en-US" smtClean="0"/>
+              <a:rPr lang="en-US"/>
               <a:t>Edit Master text styles</a:t>
             </a:r>
           </a:p>
           <a:p>
             <a:pPr lvl="1"/>
             <a:r>
-              <a:rPr lang="en-US" smtClean="0"/>
+              <a:rPr lang="en-US"/>
               <a:t>Second level</a:t>
             </a:r>
           </a:p>
           <a:p>
             <a:pPr lvl="2"/>
             <a:r>
-              <a:rPr lang="en-US" smtClean="0"/>
+              <a:rPr lang="en-US"/>
               <a:t>Third level</a:t>
             </a:r>
           </a:p>
           <a:p>
             <a:pPr lvl="3"/>
             <a:r>
-              <a:rPr lang="en-US" smtClean="0"/>
+              <a:rPr lang="en-US"/>
               <a:t>Fourth level</a:t>
             </a:r>
           </a:p>
           <a:p>
             <a:pPr lvl="4"/>
             <a:r>
-              <a:rPr lang="en-US" smtClean="0"/>
+              <a:rPr lang="en-US"/>
               <a:t>Fifth level</a:t>
             </a:r>
-            <a:endParaRPr lang="en-US"/>
           </a:p>
         </p:txBody>
       </p:sp>
@@ -2559,7 +2544,7 @@
           <a:p>
             <a:fld id="{5E08F899-8669-4B52-BC52-DF490937ED14}" type="datetimeFigureOut">
               <a:rPr lang="en-US" smtClean="0"/>
-              <a:t>5/20/2016</a:t>
+              <a:t>9/15/2022</a:t>
             </a:fld>
             <a:endParaRPr lang="en-US"/>
           </a:p>
@@ -2964,101 +2949,9 @@
           <a:chExt cx="0" cy="0"/>
         </a:xfrm>
       </p:grpSpPr>
-      <p:sp>
-        <p:nvSpPr>
-          <p:cNvPr id="2" name="Oval 1"/>
-          <p:cNvSpPr/>
-          <p:nvPr/>
-        </p:nvSpPr>
-        <p:spPr>
-          <a:xfrm>
-            <a:off x="2854036" y="2152073"/>
-            <a:ext cx="1828800" cy="1828800"/>
-          </a:xfrm>
-          <a:prstGeom prst="ellipse">
-            <a:avLst/>
-          </a:prstGeom>
-          <a:noFill/>
-          <a:ln w="19050">
-            <a:solidFill>
-              <a:schemeClr val="tx1"/>
-            </a:solidFill>
-          </a:ln>
-        </p:spPr>
-        <p:style>
-          <a:lnRef idx="2">
-            <a:schemeClr val="accent1">
-              <a:shade val="50000"/>
-            </a:schemeClr>
-          </a:lnRef>
-          <a:fillRef idx="1">
-            <a:schemeClr val="accent1"/>
-          </a:fillRef>
-          <a:effectRef idx="0">
-            <a:schemeClr val="accent1"/>
-          </a:effectRef>
-          <a:fontRef idx="minor">
-            <a:schemeClr val="lt1"/>
-          </a:fontRef>
-        </p:style>
-        <p:txBody>
-          <a:bodyPr rtlCol="0" anchor="ctr"/>
-          <a:lstStyle/>
-          <a:p>
-            <a:pPr algn="ctr"/>
-            <a:endParaRPr lang="en-US"/>
-          </a:p>
-        </p:txBody>
-      </p:sp>
-      <p:sp>
-        <p:nvSpPr>
-          <p:cNvPr id="3" name="Oval 2"/>
-          <p:cNvSpPr/>
-          <p:nvPr/>
-        </p:nvSpPr>
-        <p:spPr>
-          <a:xfrm>
-            <a:off x="2625436" y="1923473"/>
-            <a:ext cx="2286000" cy="2286000"/>
-          </a:xfrm>
-          <a:prstGeom prst="ellipse">
-            <a:avLst/>
-          </a:prstGeom>
-          <a:noFill/>
-          <a:ln w="19050">
-            <a:solidFill>
-              <a:schemeClr val="tx1"/>
-            </a:solidFill>
-          </a:ln>
-        </p:spPr>
-        <p:style>
-          <a:lnRef idx="2">
-            <a:schemeClr val="accent1">
-              <a:shade val="50000"/>
-            </a:schemeClr>
-          </a:lnRef>
-          <a:fillRef idx="1">
-            <a:schemeClr val="accent1"/>
-          </a:fillRef>
-          <a:effectRef idx="0">
-            <a:schemeClr val="accent1"/>
-          </a:effectRef>
-          <a:fontRef idx="minor">
-            <a:schemeClr val="lt1"/>
-          </a:fontRef>
-        </p:style>
-        <p:txBody>
-          <a:bodyPr rtlCol="0" anchor="ctr"/>
-          <a:lstStyle/>
-          <a:p>
-            <a:pPr algn="ctr"/>
-            <a:endParaRPr lang="en-US"/>
-          </a:p>
-        </p:txBody>
-      </p:sp>
       <p:cxnSp>
         <p:nvCxnSpPr>
-          <p:cNvPr id="5" name="Straight Connector 4"/>
+          <p:cNvPr id="5" name="x axis"/>
           <p:cNvCxnSpPr/>
           <p:nvPr/>
         </p:nvCxnSpPr>
@@ -3095,7 +2988,7 @@
       </p:cxnSp>
       <p:cxnSp>
         <p:nvCxnSpPr>
-          <p:cNvPr id="7" name="Straight Connector 6"/>
+          <p:cNvPr id="7" name="y axis"/>
           <p:cNvCxnSpPr/>
           <p:nvPr/>
         </p:nvCxnSpPr>
@@ -3132,14 +3025,72 @@
       </p:cxnSp>
       <p:sp>
         <p:nvSpPr>
-          <p:cNvPr id="8" name="TextBox 7"/>
+          <p:cNvPr id="50" name="track">
+            <a:extLst>
+              <a:ext uri="{FF2B5EF4-FFF2-40B4-BE49-F238E27FC236}">
+                <a16:creationId xmlns:a16="http://schemas.microsoft.com/office/drawing/2014/main" id="{9AD964EC-16A8-4C20-8CB7-E828C91AD26D}"/>
+              </a:ext>
+            </a:extLst>
+          </p:cNvPr>
+          <p:cNvSpPr/>
+          <p:nvPr/>
+        </p:nvSpPr>
+        <p:spPr>
+          <a:xfrm>
+            <a:off x="2624049" y="1923473"/>
+            <a:ext cx="2287814" cy="2287810"/>
+          </a:xfrm>
+          <a:prstGeom prst="donut">
+            <a:avLst>
+              <a:gd name="adj" fmla="val 9669"/>
+            </a:avLst>
+          </a:prstGeom>
+          <a:solidFill>
+            <a:schemeClr val="bg1">
+              <a:lumMod val="75000"/>
+            </a:schemeClr>
+          </a:solidFill>
+          <a:ln w="19050">
+            <a:solidFill>
+              <a:schemeClr val="tx1"/>
+            </a:solidFill>
+          </a:ln>
+        </p:spPr>
+        <p:style>
+          <a:lnRef idx="2">
+            <a:schemeClr val="accent1">
+              <a:shade val="50000"/>
+            </a:schemeClr>
+          </a:lnRef>
+          <a:fillRef idx="1">
+            <a:schemeClr val="accent1"/>
+          </a:fillRef>
+          <a:effectRef idx="0">
+            <a:schemeClr val="accent1"/>
+          </a:effectRef>
+          <a:fontRef idx="minor">
+            <a:schemeClr val="lt1"/>
+          </a:fontRef>
+        </p:style>
+        <p:txBody>
+          <a:bodyPr rtlCol="0" anchor="ctr"/>
+          <a:lstStyle/>
+          <a:p>
+            <a:pPr algn="ctr"/>
+            <a:endParaRPr lang="en-US"/>
+          </a:p>
+        </p:txBody>
+      </p:sp>
+      <p:sp>
+        <p:nvSpPr>
+          <p:cNvPr id="8" name="250 m"/>
           <p:cNvSpPr txBox="1"/>
           <p:nvPr/>
         </p:nvSpPr>
         <p:spPr>
           <a:xfrm rot="19888679">
-            <a:off x="3984817" y="2570576"/>
-            <a:ext cx="628072" cy="430887"/>
+            <a:off x="3977197" y="2555262"/>
+            <a:ext cx="628072" cy="446276"/>
           </a:xfrm>
           <a:prstGeom prst="rect">
             <a:avLst/>
@@ -3153,8 +3104,12 @@
           <a:lstStyle/>
           <a:p>
             <a:r>
-              <a:rPr lang="en-US" sz="1100" dirty="0" smtClean="0"/>
-              <a:t>250 m</a:t>
+              <a:rPr lang="en-US" sz="1200" dirty="0"/>
+              <a:t>250</a:t>
+            </a:r>
+            <a:r>
+              <a:rPr lang="en-US" sz="1100" dirty="0"/>
+              <a:t> m</a:t>
             </a:r>
           </a:p>
           <a:p>
@@ -3165,18 +3120,20 @@
       <p:cxnSp>
         <p:nvCxnSpPr>
           <p:cNvPr id="10" name="Straight Connector 9"/>
-          <p:cNvCxnSpPr/>
+          <p:cNvCxnSpPr>
+            <a:cxnSpLocks/>
+          </p:cNvCxnSpPr>
           <p:nvPr/>
         </p:nvCxnSpPr>
         <p:spPr>
           <a:xfrm flipV="1">
-            <a:off x="3768436" y="2594397"/>
-            <a:ext cx="849737" cy="472076"/>
+            <a:off x="3768436" y="2622087"/>
+            <a:ext cx="877379" cy="438692"/>
           </a:xfrm>
           <a:prstGeom prst="line">
             <a:avLst/>
           </a:prstGeom>
-          <a:ln>
+          <a:ln w="12700">
             <a:solidFill>
               <a:schemeClr val="tx1"/>
             </a:solidFill>
@@ -3201,18 +3158,20 @@
       <p:cxnSp>
         <p:nvCxnSpPr>
           <p:cNvPr id="12" name="Straight Connector 11"/>
-          <p:cNvCxnSpPr/>
+          <p:cNvCxnSpPr>
+            <a:cxnSpLocks/>
+          </p:cNvCxnSpPr>
           <p:nvPr/>
         </p:nvCxnSpPr>
         <p:spPr>
           <a:xfrm>
-            <a:off x="3768436" y="3070617"/>
-            <a:ext cx="849737" cy="472076"/>
+            <a:off x="3768435" y="3070617"/>
+            <a:ext cx="850745" cy="425373"/>
           </a:xfrm>
           <a:prstGeom prst="line">
             <a:avLst/>
           </a:prstGeom>
-          <a:ln>
+          <a:ln w="12700">
             <a:solidFill>
               <a:schemeClr val="tx1"/>
             </a:solidFill>
@@ -3234,17 +3193,17 @@
           </a:fontRef>
         </p:style>
       </p:cxnSp>
-      <mc:AlternateContent xmlns:mc="http://schemas.openxmlformats.org/markup-compatibility/2006">
-        <mc:Choice xmlns:a14="http://schemas.microsoft.com/office/drawing/2010/main" Requires="a14">
+      <mc:AlternateContent xmlns:mc="http://schemas.openxmlformats.org/markup-compatibility/2006" xmlns:a14="http://schemas.microsoft.com/office/drawing/2010/main">
+        <mc:Choice Requires="a14">
           <p:sp>
             <p:nvSpPr>
-              <p:cNvPr id="13" name="TextBox 12"/>
+              <p:cNvPr id="13" name="x"/>
               <p:cNvSpPr txBox="1"/>
               <p:nvPr/>
             </p:nvSpPr>
             <p:spPr>
               <a:xfrm>
-                <a:off x="5298208" y="3066472"/>
+                <a:off x="5513371" y="2941236"/>
                 <a:ext cx="369454" cy="261610"/>
               </a:xfrm>
               <a:prstGeom prst="rect">
@@ -3258,6 +3217,7 @@
               </a:bodyPr>
               <a:lstStyle/>
               <a:p>
+                <a:pPr/>
                 <a14:m>
                   <m:oMathPara xmlns:m="http://schemas.openxmlformats.org/officeDocument/2006/math">
                     <m:oMathParaPr>
@@ -3278,10 +3238,10 @@
             </p:txBody>
           </p:sp>
         </mc:Choice>
-        <mc:Fallback>
+        <mc:Fallback xmlns="">
           <p:sp>
             <p:nvSpPr>
-              <p:cNvPr id="13" name="TextBox 12"/>
+              <p:cNvPr id="13" name="x"/>
               <p:cNvSpPr txBox="1">
                 <a:spLocks noRot="1" noChangeAspect="1" noMove="1" noResize="1" noEditPoints="1" noAdjustHandles="1" noChangeArrowheads="1" noChangeShapeType="1" noTextEdit="1"/>
               </p:cNvSpPr>
@@ -3289,7 +3249,7 @@
             </p:nvSpPr>
             <p:spPr>
               <a:xfrm>
-                <a:off x="5298208" y="3066472"/>
+                <a:off x="5513371" y="2941236"/>
                 <a:ext cx="369454" cy="261610"/>
               </a:xfrm>
               <a:prstGeom prst="rect">
@@ -3317,17 +3277,17 @@
           </p:sp>
         </mc:Fallback>
       </mc:AlternateContent>
-      <mc:AlternateContent xmlns:mc="http://schemas.openxmlformats.org/markup-compatibility/2006">
-        <mc:Choice xmlns:a14="http://schemas.microsoft.com/office/drawing/2010/main" Requires="a14">
+      <mc:AlternateContent xmlns:mc="http://schemas.openxmlformats.org/markup-compatibility/2006" xmlns:a14="http://schemas.microsoft.com/office/drawing/2010/main">
+        <mc:Choice Requires="a14">
           <p:sp>
             <p:nvSpPr>
-              <p:cNvPr id="14" name="TextBox 13"/>
+              <p:cNvPr id="14" name="y"/>
               <p:cNvSpPr txBox="1"/>
               <p:nvPr/>
             </p:nvSpPr>
             <p:spPr>
               <a:xfrm>
-                <a:off x="3398982" y="1295880"/>
+                <a:off x="3436882" y="1223405"/>
                 <a:ext cx="369454" cy="261610"/>
               </a:xfrm>
               <a:prstGeom prst="rect">
@@ -3341,6 +3301,7 @@
               </a:bodyPr>
               <a:lstStyle/>
               <a:p>
+                <a:pPr/>
                 <a14:m>
                   <m:oMathPara xmlns:m="http://schemas.openxmlformats.org/officeDocument/2006/math">
                     <m:oMathParaPr>
@@ -3361,10 +3322,10 @@
             </p:txBody>
           </p:sp>
         </mc:Choice>
-        <mc:Fallback>
+        <mc:Fallback xmlns="">
           <p:sp>
             <p:nvSpPr>
-              <p:cNvPr id="14" name="TextBox 13"/>
+              <p:cNvPr id="14" name="y"/>
               <p:cNvSpPr txBox="1">
                 <a:spLocks noRot="1" noChangeAspect="1" noMove="1" noResize="1" noEditPoints="1" noAdjustHandles="1" noChangeArrowheads="1" noChangeShapeType="1" noTextEdit="1"/>
               </p:cNvSpPr>
@@ -3372,7 +3333,7 @@
             </p:nvSpPr>
             <p:spPr>
               <a:xfrm>
-                <a:off x="3398982" y="1295880"/>
+                <a:off x="3436882" y="1223405"/>
                 <a:ext cx="369454" cy="261610"/>
               </a:xfrm>
               <a:prstGeom prst="rect">
@@ -3381,7 +3342,7 @@
               <a:blipFill>
                 <a:blip r:embed="rId3"/>
                 <a:stretch>
-                  <a:fillRect b="-2381"/>
+                  <a:fillRect/>
                 </a:stretch>
               </a:blipFill>
             </p:spPr>
@@ -3400,18 +3361,18 @@
           </p:sp>
         </mc:Fallback>
       </mc:AlternateContent>
-      <mc:AlternateContent xmlns:mc="http://schemas.openxmlformats.org/markup-compatibility/2006">
-        <mc:Choice xmlns:a14="http://schemas.microsoft.com/office/drawing/2010/main" Requires="a14">
+      <mc:AlternateContent xmlns:mc="http://schemas.openxmlformats.org/markup-compatibility/2006" xmlns:a14="http://schemas.microsoft.com/office/drawing/2010/main">
+        <mc:Choice Requires="a14">
           <p:sp>
             <p:nvSpPr>
-              <p:cNvPr id="15" name="TextBox 14"/>
+              <p:cNvPr id="15" name="TextBox theta"/>
               <p:cNvSpPr txBox="1"/>
               <p:nvPr/>
             </p:nvSpPr>
             <p:spPr>
               <a:xfrm>
-                <a:off x="3916219" y="3033461"/>
-                <a:ext cx="369454" cy="261610"/>
+                <a:off x="4125708" y="3056822"/>
+                <a:ext cx="369454" cy="276999"/>
               </a:xfrm>
               <a:prstGeom prst="rect">
                 <a:avLst/>
@@ -3424,6 +3385,7 @@
               </a:bodyPr>
               <a:lstStyle/>
               <a:p>
+                <a:pPr/>
                 <a14:m>
                   <m:oMathPara xmlns:m="http://schemas.openxmlformats.org/officeDocument/2006/math">
                     <m:oMathParaPr>
@@ -3431,7 +3393,10 @@
                     </m:oMathParaPr>
                     <m:oMath xmlns:m="http://schemas.openxmlformats.org/officeDocument/2006/math">
                       <m:r>
-                        <a:rPr lang="en-US" sz="1100" b="0" i="1" smtClean="0">
+                        <a:rPr lang="en-US" sz="1200" b="0" i="1" smtClean="0">
+                          <a:solidFill>
+                            <a:schemeClr val="tx1"/>
+                          </a:solidFill>
                           <a:latin typeface="Cambria Math" panose="02040503050406030204" pitchFamily="18" charset="0"/>
                         </a:rPr>
                         <m:t>𝜃</m:t>
@@ -3439,15 +3404,19 @@
                     </m:oMath>
                   </m:oMathPara>
                 </a14:m>
-                <a:endParaRPr lang="en-US" sz="1100" dirty="0"/>
+                <a:endParaRPr lang="en-US" sz="1100" dirty="0">
+                  <a:solidFill>
+                    <a:schemeClr val="tx1"/>
+                  </a:solidFill>
+                </a:endParaRPr>
               </a:p>
             </p:txBody>
           </p:sp>
         </mc:Choice>
-        <mc:Fallback>
+        <mc:Fallback xmlns="">
           <p:sp>
             <p:nvSpPr>
-              <p:cNvPr id="15" name="TextBox 14"/>
+              <p:cNvPr id="15" name="TextBox theta"/>
               <p:cNvSpPr txBox="1">
                 <a:spLocks noRot="1" noChangeAspect="1" noMove="1" noResize="1" noEditPoints="1" noAdjustHandles="1" noChangeArrowheads="1" noChangeShapeType="1" noTextEdit="1"/>
               </p:cNvSpPr>
@@ -3455,8 +3424,8 @@
             </p:nvSpPr>
             <p:spPr>
               <a:xfrm>
-                <a:off x="3916219" y="3033461"/>
-                <a:ext cx="369454" cy="261610"/>
+                <a:off x="4125708" y="3056822"/>
+                <a:ext cx="369454" cy="276999"/>
               </a:xfrm>
               <a:prstGeom prst="rect">
                 <a:avLst/>
@@ -3483,17 +3452,1041 @@
           </p:sp>
         </mc:Fallback>
       </mc:AlternateContent>
-      <mc:AlternateContent xmlns:mc="http://schemas.openxmlformats.org/markup-compatibility/2006">
-        <mc:Choice xmlns:a14="http://schemas.microsoft.com/office/drawing/2010/main" Requires="a14">
+      <mc:AlternateContent xmlns:mc="http://schemas.openxmlformats.org/markup-compatibility/2006" xmlns:a14="http://schemas.microsoft.com/office/drawing/2010/main">
+        <mc:Choice Requires="a14">
           <p:sp>
             <p:nvSpPr>
-              <p:cNvPr id="16" name="TextBox 15"/>
+              <p:cNvPr id="16" name="TextBox theta"/>
               <p:cNvSpPr txBox="1"/>
               <p:nvPr/>
             </p:nvSpPr>
             <p:spPr>
               <a:xfrm>
-                <a:off x="3916220" y="2857805"/>
+                <a:off x="4129159" y="2802737"/>
+                <a:ext cx="369454" cy="276999"/>
+              </a:xfrm>
+              <a:prstGeom prst="rect">
+                <a:avLst/>
+              </a:prstGeom>
+              <a:noFill/>
+            </p:spPr>
+            <p:txBody>
+              <a:bodyPr wrap="square" rtlCol="0">
+                <a:spAutoFit/>
+              </a:bodyPr>
+              <a:lstStyle/>
+              <a:p>
+                <a:pPr/>
+                <a14:m>
+                  <m:oMathPara xmlns:m="http://schemas.openxmlformats.org/officeDocument/2006/math">
+                    <m:oMathParaPr>
+                      <m:jc m:val="centerGroup"/>
+                    </m:oMathParaPr>
+                    <m:oMath xmlns:m="http://schemas.openxmlformats.org/officeDocument/2006/math">
+                      <m:r>
+                        <a:rPr lang="en-US" sz="1200" b="0" i="1" smtClean="0">
+                          <a:solidFill>
+                            <a:schemeClr val="tx1"/>
+                          </a:solidFill>
+                          <a:latin typeface="Cambria Math" panose="02040503050406030204" pitchFamily="18" charset="0"/>
+                        </a:rPr>
+                        <m:t>𝜃</m:t>
+                      </m:r>
+                    </m:oMath>
+                  </m:oMathPara>
+                </a14:m>
+                <a:endParaRPr lang="en-US" sz="1200" dirty="0">
+                  <a:solidFill>
+                    <a:schemeClr val="tx1"/>
+                  </a:solidFill>
+                </a:endParaRPr>
+              </a:p>
+            </p:txBody>
+          </p:sp>
+        </mc:Choice>
+        <mc:Fallback xmlns="">
+          <p:sp>
+            <p:nvSpPr>
+              <p:cNvPr id="16" name="TextBox theta"/>
+              <p:cNvSpPr txBox="1">
+                <a:spLocks noRot="1" noChangeAspect="1" noMove="1" noResize="1" noEditPoints="1" noAdjustHandles="1" noChangeArrowheads="1" noChangeShapeType="1" noTextEdit="1"/>
+              </p:cNvSpPr>
+              <p:nvPr/>
+            </p:nvSpPr>
+            <p:spPr>
+              <a:xfrm>
+                <a:off x="4129159" y="2802737"/>
+                <a:ext cx="369454" cy="276999"/>
+              </a:xfrm>
+              <a:prstGeom prst="rect">
+                <a:avLst/>
+              </a:prstGeom>
+              <a:blipFill>
+                <a:blip r:embed="rId5"/>
+                <a:stretch>
+                  <a:fillRect/>
+                </a:stretch>
+              </a:blipFill>
+            </p:spPr>
+            <p:txBody>
+              <a:bodyPr/>
+              <a:lstStyle/>
+              <a:p>
+                <a:r>
+                  <a:rPr lang="en-US">
+                    <a:noFill/>
+                  </a:rPr>
+                  <a:t> </a:t>
+                </a:r>
+              </a:p>
+            </p:txBody>
+          </p:sp>
+        </mc:Fallback>
+      </mc:AlternateContent>
+      <p:sp>
+        <p:nvSpPr>
+          <p:cNvPr id="20" name="TextBox B"/>
+          <p:cNvSpPr txBox="1"/>
+          <p:nvPr/>
+        </p:nvSpPr>
+        <p:spPr>
+          <a:xfrm>
+            <a:off x="4526136" y="3366884"/>
+            <a:ext cx="373707" cy="338554"/>
+          </a:xfrm>
+          <a:prstGeom prst="rect">
+            <a:avLst/>
+          </a:prstGeom>
+          <a:noFill/>
+        </p:spPr>
+        <p:txBody>
+          <a:bodyPr wrap="square" rtlCol="0">
+            <a:spAutoFit/>
+          </a:bodyPr>
+          <a:lstStyle/>
+          <a:p>
+            <a:r>
+              <a:rPr lang="en-US" sz="1600" dirty="0"/>
+              <a:t>B</a:t>
+            </a:r>
+          </a:p>
+        </p:txBody>
+      </p:sp>
+      <p:sp>
+        <p:nvSpPr>
+          <p:cNvPr id="21" name="TextBox C"/>
+          <p:cNvSpPr txBox="1"/>
+          <p:nvPr/>
+        </p:nvSpPr>
+        <p:spPr>
+          <a:xfrm>
+            <a:off x="4545447" y="2431662"/>
+            <a:ext cx="373707" cy="338554"/>
+          </a:xfrm>
+          <a:prstGeom prst="rect">
+            <a:avLst/>
+          </a:prstGeom>
+          <a:noFill/>
+        </p:spPr>
+        <p:txBody>
+          <a:bodyPr wrap="square" rtlCol="0">
+            <a:spAutoFit/>
+          </a:bodyPr>
+          <a:lstStyle/>
+          <a:p>
+            <a:r>
+              <a:rPr lang="en-US" sz="1600" dirty="0"/>
+              <a:t>C</a:t>
+            </a:r>
+          </a:p>
+        </p:txBody>
+      </p:sp>
+      <p:sp>
+        <p:nvSpPr>
+          <p:cNvPr id="22" name="TextBox D"/>
+          <p:cNvSpPr txBox="1"/>
+          <p:nvPr/>
+        </p:nvSpPr>
+        <p:spPr>
+          <a:xfrm>
+            <a:off x="3619483" y="1865631"/>
+            <a:ext cx="373707" cy="338554"/>
+          </a:xfrm>
+          <a:prstGeom prst="rect">
+            <a:avLst/>
+          </a:prstGeom>
+          <a:noFill/>
+        </p:spPr>
+        <p:txBody>
+          <a:bodyPr wrap="square" rtlCol="0">
+            <a:spAutoFit/>
+          </a:bodyPr>
+          <a:lstStyle/>
+          <a:p>
+            <a:r>
+              <a:rPr lang="en-US" sz="1600" dirty="0"/>
+              <a:t>D</a:t>
+            </a:r>
+          </a:p>
+        </p:txBody>
+      </p:sp>
+      <p:sp>
+        <p:nvSpPr>
+          <p:cNvPr id="17" name="TextBox A"/>
+          <p:cNvSpPr txBox="1"/>
+          <p:nvPr/>
+        </p:nvSpPr>
+        <p:spPr>
+          <a:xfrm>
+            <a:off x="3619484" y="3933592"/>
+            <a:ext cx="373707" cy="338554"/>
+          </a:xfrm>
+          <a:prstGeom prst="rect">
+            <a:avLst/>
+          </a:prstGeom>
+          <a:noFill/>
+        </p:spPr>
+        <p:txBody>
+          <a:bodyPr wrap="square" rtlCol="0">
+            <a:spAutoFit/>
+          </a:bodyPr>
+          <a:lstStyle/>
+          <a:p>
+            <a:r>
+              <a:rPr lang="en-US" sz="1600" dirty="0"/>
+              <a:t>A</a:t>
+            </a:r>
+          </a:p>
+        </p:txBody>
+      </p:sp>
+      <p:grpSp>
+        <p:nvGrpSpPr>
+          <p:cNvPr id="53" name="Group 52">
+            <a:extLst>
+              <a:ext uri="{FF2B5EF4-FFF2-40B4-BE49-F238E27FC236}">
+                <a16:creationId xmlns:a16="http://schemas.microsoft.com/office/drawing/2014/main" id="{5C028CC2-3154-4D9B-97ED-C9EACBBDA64A}"/>
+              </a:ext>
+            </a:extLst>
+          </p:cNvPr>
+          <p:cNvGrpSpPr/>
+          <p:nvPr/>
+        </p:nvGrpSpPr>
+        <p:grpSpPr>
+          <a:xfrm>
+            <a:off x="3311209" y="2609018"/>
+            <a:ext cx="914400" cy="914400"/>
+            <a:chOff x="3375375" y="2669626"/>
+            <a:chExt cx="788805" cy="817752"/>
+          </a:xfrm>
+        </p:grpSpPr>
+        <p:sp>
+          <p:nvSpPr>
+            <p:cNvPr id="51" name="Arc 50">
+              <a:extLst>
+                <a:ext uri="{FF2B5EF4-FFF2-40B4-BE49-F238E27FC236}">
+                  <a16:creationId xmlns:a16="http://schemas.microsoft.com/office/drawing/2014/main" id="{C6D68AF9-6421-446E-9AC0-C5ED3A0D67CF}"/>
+                </a:ext>
+              </a:extLst>
+            </p:cNvPr>
+            <p:cNvSpPr/>
+            <p:nvPr/>
+          </p:nvSpPr>
+          <p:spPr>
+            <a:xfrm rot="5400000">
+              <a:off x="3366427" y="2682215"/>
+              <a:ext cx="810342" cy="785164"/>
+            </a:xfrm>
+            <a:prstGeom prst="arc">
+              <a:avLst>
+                <a:gd name="adj1" fmla="val 16223828"/>
+                <a:gd name="adj2" fmla="val 17906249"/>
+              </a:avLst>
+            </a:prstGeom>
+            <a:ln w="12700">
+              <a:solidFill>
+                <a:schemeClr val="tx1"/>
+              </a:solidFill>
+              <a:headEnd type="arrow" w="sm" len="sm"/>
+              <a:tailEnd type="arrow" w="sm" len="sm"/>
+            </a:ln>
+          </p:spPr>
+          <p:style>
+            <a:lnRef idx="1">
+              <a:schemeClr val="accent1"/>
+            </a:lnRef>
+            <a:fillRef idx="0">
+              <a:schemeClr val="accent1"/>
+            </a:fillRef>
+            <a:effectRef idx="0">
+              <a:schemeClr val="accent1"/>
+            </a:effectRef>
+            <a:fontRef idx="minor">
+              <a:schemeClr val="tx1"/>
+            </a:fontRef>
+          </p:style>
+          <p:txBody>
+            <a:bodyPr rtlCol="0" anchor="ctr"/>
+            <a:lstStyle/>
+            <a:p>
+              <a:pPr algn="ctr"/>
+              <a:endParaRPr lang="en-US"/>
+            </a:p>
+          </p:txBody>
+        </p:sp>
+        <p:sp>
+          <p:nvSpPr>
+            <p:cNvPr id="52" name="Arc 51">
+              <a:extLst>
+                <a:ext uri="{FF2B5EF4-FFF2-40B4-BE49-F238E27FC236}">
+                  <a16:creationId xmlns:a16="http://schemas.microsoft.com/office/drawing/2014/main" id="{DD71C409-55F1-4970-AAB8-754E73E008DE}"/>
+                </a:ext>
+              </a:extLst>
+            </p:cNvPr>
+            <p:cNvSpPr/>
+            <p:nvPr/>
+          </p:nvSpPr>
+          <p:spPr>
+            <a:xfrm rot="16200000" flipV="1">
+              <a:off x="3362786" y="2689625"/>
+              <a:ext cx="810342" cy="785164"/>
+            </a:xfrm>
+            <a:prstGeom prst="arc">
+              <a:avLst>
+                <a:gd name="adj1" fmla="val 16223828"/>
+                <a:gd name="adj2" fmla="val 17783741"/>
+              </a:avLst>
+            </a:prstGeom>
+            <a:ln w="12700">
+              <a:solidFill>
+                <a:schemeClr val="tx1"/>
+              </a:solidFill>
+              <a:headEnd type="arrow" w="sm" len="sm"/>
+              <a:tailEnd type="arrow" w="sm" len="sm"/>
+            </a:ln>
+          </p:spPr>
+          <p:style>
+            <a:lnRef idx="1">
+              <a:schemeClr val="accent1"/>
+            </a:lnRef>
+            <a:fillRef idx="0">
+              <a:schemeClr val="accent1"/>
+            </a:fillRef>
+            <a:effectRef idx="0">
+              <a:schemeClr val="accent1"/>
+            </a:effectRef>
+            <a:fontRef idx="minor">
+              <a:schemeClr val="tx1"/>
+            </a:fontRef>
+          </p:style>
+          <p:txBody>
+            <a:bodyPr rtlCol="0" anchor="ctr"/>
+            <a:lstStyle/>
+            <a:p>
+              <a:pPr algn="ctr"/>
+              <a:endParaRPr lang="en-US"/>
+            </a:p>
+          </p:txBody>
+        </p:sp>
+      </p:grpSp>
+      <p:cxnSp>
+        <p:nvCxnSpPr>
+          <p:cNvPr id="6" name="Straight Arrow Connector 5" hidden="1">
+            <a:extLst>
+              <a:ext uri="{FF2B5EF4-FFF2-40B4-BE49-F238E27FC236}">
+                <a16:creationId xmlns:a16="http://schemas.microsoft.com/office/drawing/2014/main" id="{E989F936-2CCE-4FB3-8701-D2B9C31EFF8B}"/>
+              </a:ext>
+            </a:extLst>
+          </p:cNvPr>
+          <p:cNvCxnSpPr>
+            <a:cxnSpLocks/>
+          </p:cNvCxnSpPr>
+          <p:nvPr/>
+        </p:nvCxnSpPr>
+        <p:spPr>
+          <a:xfrm flipV="1">
+            <a:off x="4693558" y="2439368"/>
+            <a:ext cx="548640" cy="1097280"/>
+          </a:xfrm>
+          <a:prstGeom prst="straightConnector1">
+            <a:avLst/>
+          </a:prstGeom>
+          <a:ln w="19050">
+            <a:solidFill>
+              <a:schemeClr val="tx1"/>
+            </a:solidFill>
+            <a:headEnd type="none" w="med" len="med"/>
+            <a:tailEnd type="arrow" w="med" len="med"/>
+          </a:ln>
+        </p:spPr>
+        <p:style>
+          <a:lnRef idx="1">
+            <a:schemeClr val="accent1"/>
+          </a:lnRef>
+          <a:fillRef idx="0">
+            <a:schemeClr val="accent1"/>
+          </a:fillRef>
+          <a:effectRef idx="0">
+            <a:schemeClr val="accent1"/>
+          </a:effectRef>
+          <a:fontRef idx="minor">
+            <a:schemeClr val="tx1"/>
+          </a:fontRef>
+        </p:style>
+      </p:cxnSp>
+      <p:cxnSp>
+        <p:nvCxnSpPr>
+          <p:cNvPr id="23" name="Straight Arrow Connector 22" hidden="1">
+            <a:extLst>
+              <a:ext uri="{FF2B5EF4-FFF2-40B4-BE49-F238E27FC236}">
+                <a16:creationId xmlns:a16="http://schemas.microsoft.com/office/drawing/2014/main" id="{1A373A94-8E05-457A-B763-09AAC34B6E79}"/>
+              </a:ext>
+            </a:extLst>
+          </p:cNvPr>
+          <p:cNvCxnSpPr>
+            <a:cxnSpLocks/>
+          </p:cNvCxnSpPr>
+          <p:nvPr/>
+        </p:nvCxnSpPr>
+        <p:spPr>
+          <a:xfrm flipH="1" flipV="1">
+            <a:off x="4142180" y="1505571"/>
+            <a:ext cx="548640" cy="1097280"/>
+          </a:xfrm>
+          <a:prstGeom prst="straightConnector1">
+            <a:avLst/>
+          </a:prstGeom>
+          <a:ln w="19050">
+            <a:solidFill>
+              <a:schemeClr val="tx1"/>
+            </a:solidFill>
+            <a:headEnd type="none" w="med" len="med"/>
+            <a:tailEnd type="arrow" w="med" len="med"/>
+          </a:ln>
+        </p:spPr>
+        <p:style>
+          <a:lnRef idx="1">
+            <a:schemeClr val="accent1"/>
+          </a:lnRef>
+          <a:fillRef idx="0">
+            <a:schemeClr val="accent1"/>
+          </a:fillRef>
+          <a:effectRef idx="0">
+            <a:schemeClr val="accent1"/>
+          </a:effectRef>
+          <a:fontRef idx="minor">
+            <a:schemeClr val="tx1"/>
+          </a:fontRef>
+        </p:style>
+      </p:cxnSp>
+      <p:sp>
+        <p:nvSpPr>
+          <p:cNvPr id="30" name="right angle" hidden="1">
+            <a:extLst>
+              <a:ext uri="{FF2B5EF4-FFF2-40B4-BE49-F238E27FC236}">
+                <a16:creationId xmlns:a16="http://schemas.microsoft.com/office/drawing/2014/main" id="{79B933BC-508A-41E2-AF94-B905A671ACF8}"/>
+              </a:ext>
+            </a:extLst>
+          </p:cNvPr>
+          <p:cNvSpPr/>
+          <p:nvPr/>
+        </p:nvSpPr>
+        <p:spPr>
+          <a:xfrm rot="14462811">
+            <a:off x="4525002" y="2497713"/>
+            <a:ext cx="137160" cy="137160"/>
+          </a:xfrm>
+          <a:custGeom>
+            <a:avLst/>
+            <a:gdLst>
+              <a:gd name="connsiteX0" fmla="*/ 0 w 830580"/>
+              <a:gd name="connsiteY0" fmla="*/ 0 h 701040"/>
+              <a:gd name="connsiteX1" fmla="*/ 830580 w 830580"/>
+              <a:gd name="connsiteY1" fmla="*/ 0 h 701040"/>
+              <a:gd name="connsiteX2" fmla="*/ 830580 w 830580"/>
+              <a:gd name="connsiteY2" fmla="*/ 701040 h 701040"/>
+            </a:gdLst>
+            <a:ahLst/>
+            <a:cxnLst>
+              <a:cxn ang="0">
+                <a:pos x="connsiteX0" y="connsiteY0"/>
+              </a:cxn>
+              <a:cxn ang="0">
+                <a:pos x="connsiteX1" y="connsiteY1"/>
+              </a:cxn>
+              <a:cxn ang="0">
+                <a:pos x="connsiteX2" y="connsiteY2"/>
+              </a:cxn>
+            </a:cxnLst>
+            <a:rect l="l" t="t" r="r" b="b"/>
+            <a:pathLst>
+              <a:path w="830580" h="701040">
+                <a:moveTo>
+                  <a:pt x="0" y="0"/>
+                </a:moveTo>
+                <a:lnTo>
+                  <a:pt x="830580" y="0"/>
+                </a:lnTo>
+                <a:lnTo>
+                  <a:pt x="830580" y="701040"/>
+                </a:lnTo>
+              </a:path>
+            </a:pathLst>
+          </a:custGeom>
+          <a:noFill/>
+          <a:ln w="19050">
+            <a:solidFill>
+              <a:schemeClr val="tx1"/>
+            </a:solidFill>
+          </a:ln>
+        </p:spPr>
+        <p:style>
+          <a:lnRef idx="2">
+            <a:schemeClr val="accent1">
+              <a:shade val="50000"/>
+            </a:schemeClr>
+          </a:lnRef>
+          <a:fillRef idx="1">
+            <a:schemeClr val="accent1"/>
+          </a:fillRef>
+          <a:effectRef idx="0">
+            <a:schemeClr val="accent1"/>
+          </a:effectRef>
+          <a:fontRef idx="minor">
+            <a:schemeClr val="lt1"/>
+          </a:fontRef>
+        </p:style>
+        <p:txBody>
+          <a:bodyPr rtlCol="0" anchor="ctr"/>
+          <a:lstStyle/>
+          <a:p>
+            <a:pPr algn="ctr"/>
+            <a:endParaRPr lang="en-US"/>
+          </a:p>
+        </p:txBody>
+      </p:sp>
+      <p:sp>
+        <p:nvSpPr>
+          <p:cNvPr id="31" name="right angle" hidden="1">
+            <a:extLst>
+              <a:ext uri="{FF2B5EF4-FFF2-40B4-BE49-F238E27FC236}">
+                <a16:creationId xmlns:a16="http://schemas.microsoft.com/office/drawing/2014/main" id="{2FFA0ADE-31D7-4F88-AA2C-28FB7BA33FD0}"/>
+              </a:ext>
+            </a:extLst>
+          </p:cNvPr>
+          <p:cNvSpPr/>
+          <p:nvPr/>
+        </p:nvSpPr>
+        <p:spPr>
+          <a:xfrm rot="18015991">
+            <a:off x="4584499" y="3372337"/>
+            <a:ext cx="137160" cy="137160"/>
+          </a:xfrm>
+          <a:custGeom>
+            <a:avLst/>
+            <a:gdLst>
+              <a:gd name="connsiteX0" fmla="*/ 0 w 830580"/>
+              <a:gd name="connsiteY0" fmla="*/ 0 h 701040"/>
+              <a:gd name="connsiteX1" fmla="*/ 830580 w 830580"/>
+              <a:gd name="connsiteY1" fmla="*/ 0 h 701040"/>
+              <a:gd name="connsiteX2" fmla="*/ 830580 w 830580"/>
+              <a:gd name="connsiteY2" fmla="*/ 701040 h 701040"/>
+            </a:gdLst>
+            <a:ahLst/>
+            <a:cxnLst>
+              <a:cxn ang="0">
+                <a:pos x="connsiteX0" y="connsiteY0"/>
+              </a:cxn>
+              <a:cxn ang="0">
+                <a:pos x="connsiteX1" y="connsiteY1"/>
+              </a:cxn>
+              <a:cxn ang="0">
+                <a:pos x="connsiteX2" y="connsiteY2"/>
+              </a:cxn>
+            </a:cxnLst>
+            <a:rect l="l" t="t" r="r" b="b"/>
+            <a:pathLst>
+              <a:path w="830580" h="701040">
+                <a:moveTo>
+                  <a:pt x="0" y="0"/>
+                </a:moveTo>
+                <a:lnTo>
+                  <a:pt x="830580" y="0"/>
+                </a:lnTo>
+                <a:lnTo>
+                  <a:pt x="830580" y="701040"/>
+                </a:lnTo>
+              </a:path>
+            </a:pathLst>
+          </a:custGeom>
+          <a:noFill/>
+          <a:ln w="19050">
+            <a:solidFill>
+              <a:schemeClr val="tx1"/>
+            </a:solidFill>
+          </a:ln>
+        </p:spPr>
+        <p:style>
+          <a:lnRef idx="2">
+            <a:schemeClr val="accent1">
+              <a:shade val="50000"/>
+            </a:schemeClr>
+          </a:lnRef>
+          <a:fillRef idx="1">
+            <a:schemeClr val="accent1"/>
+          </a:fillRef>
+          <a:effectRef idx="0">
+            <a:schemeClr val="accent1"/>
+          </a:effectRef>
+          <a:fontRef idx="minor">
+            <a:schemeClr val="lt1"/>
+          </a:fontRef>
+        </p:style>
+        <p:txBody>
+          <a:bodyPr rtlCol="0" anchor="ctr"/>
+          <a:lstStyle/>
+          <a:p>
+            <a:pPr algn="ctr"/>
+            <a:endParaRPr lang="en-US"/>
+          </a:p>
+        </p:txBody>
+      </p:sp>
+      <p:cxnSp>
+        <p:nvCxnSpPr>
+          <p:cNvPr id="32" name="Straight Connector 31" hidden="1">
+            <a:extLst>
+              <a:ext uri="{FF2B5EF4-FFF2-40B4-BE49-F238E27FC236}">
+                <a16:creationId xmlns:a16="http://schemas.microsoft.com/office/drawing/2014/main" id="{35D51ACC-A06B-4794-9680-401EFDE6BD4D}"/>
+              </a:ext>
+            </a:extLst>
+          </p:cNvPr>
+          <p:cNvCxnSpPr/>
+          <p:nvPr/>
+        </p:nvCxnSpPr>
+        <p:spPr>
+          <a:xfrm>
+            <a:off x="4689685" y="3534715"/>
+            <a:ext cx="849737" cy="0"/>
+          </a:xfrm>
+          <a:prstGeom prst="line">
+            <a:avLst/>
+          </a:prstGeom>
+          <a:ln w="12700">
+            <a:solidFill>
+              <a:schemeClr val="tx1"/>
+            </a:solidFill>
+            <a:prstDash val="dash"/>
+          </a:ln>
+        </p:spPr>
+        <p:style>
+          <a:lnRef idx="1">
+            <a:schemeClr val="accent1"/>
+          </a:lnRef>
+          <a:fillRef idx="0">
+            <a:schemeClr val="accent1"/>
+          </a:fillRef>
+          <a:effectRef idx="0">
+            <a:schemeClr val="accent1"/>
+          </a:effectRef>
+          <a:fontRef idx="minor">
+            <a:schemeClr val="tx1"/>
+          </a:fontRef>
+        </p:style>
+      </p:cxnSp>
+      <p:cxnSp>
+        <p:nvCxnSpPr>
+          <p:cNvPr id="33" name="Straight Connector 32" hidden="1">
+            <a:extLst>
+              <a:ext uri="{FF2B5EF4-FFF2-40B4-BE49-F238E27FC236}">
+                <a16:creationId xmlns:a16="http://schemas.microsoft.com/office/drawing/2014/main" id="{B11B36BB-10EA-4EFE-BF03-744242CD7B58}"/>
+              </a:ext>
+            </a:extLst>
+          </p:cNvPr>
+          <p:cNvCxnSpPr>
+            <a:cxnSpLocks/>
+          </p:cNvCxnSpPr>
+          <p:nvPr/>
+        </p:nvCxnSpPr>
+        <p:spPr>
+          <a:xfrm flipV="1">
+            <a:off x="4690760" y="1832610"/>
+            <a:ext cx="0" cy="1701485"/>
+          </a:xfrm>
+          <a:prstGeom prst="line">
+            <a:avLst/>
+          </a:prstGeom>
+          <a:ln w="12700">
+            <a:solidFill>
+              <a:schemeClr val="tx1"/>
+            </a:solidFill>
+            <a:prstDash val="dash"/>
+          </a:ln>
+        </p:spPr>
+        <p:style>
+          <a:lnRef idx="1">
+            <a:schemeClr val="accent1"/>
+          </a:lnRef>
+          <a:fillRef idx="0">
+            <a:schemeClr val="accent1"/>
+          </a:fillRef>
+          <a:effectRef idx="0">
+            <a:schemeClr val="accent1"/>
+          </a:effectRef>
+          <a:fontRef idx="minor">
+            <a:schemeClr val="tx1"/>
+          </a:fontRef>
+        </p:style>
+      </p:cxnSp>
+      <p:grpSp>
+        <p:nvGrpSpPr>
+          <p:cNvPr id="44" name="Group 43" hidden="1">
+            <a:extLst>
+              <a:ext uri="{FF2B5EF4-FFF2-40B4-BE49-F238E27FC236}">
+                <a16:creationId xmlns:a16="http://schemas.microsoft.com/office/drawing/2014/main" id="{1F951549-0813-4BF5-A40C-86A525E80718}"/>
+              </a:ext>
+            </a:extLst>
+          </p:cNvPr>
+          <p:cNvGrpSpPr/>
+          <p:nvPr/>
+        </p:nvGrpSpPr>
+        <p:grpSpPr>
+          <a:xfrm>
+            <a:off x="4235118" y="3075704"/>
+            <a:ext cx="914400" cy="914400"/>
+            <a:chOff x="4320085" y="3179728"/>
+            <a:chExt cx="745052" cy="768834"/>
+          </a:xfrm>
+        </p:grpSpPr>
+        <p:sp>
+          <p:nvSpPr>
+            <p:cNvPr id="35" name="Arc 34">
+              <a:extLst>
+                <a:ext uri="{FF2B5EF4-FFF2-40B4-BE49-F238E27FC236}">
+                  <a16:creationId xmlns:a16="http://schemas.microsoft.com/office/drawing/2014/main" id="{0D45DB91-B73A-499C-8AB8-B70BBD2E3A9A}"/>
+                </a:ext>
+              </a:extLst>
+            </p:cNvPr>
+            <p:cNvSpPr/>
+            <p:nvPr/>
+          </p:nvSpPr>
+          <p:spPr>
+            <a:xfrm>
+              <a:off x="4321887" y="3179728"/>
+              <a:ext cx="743250" cy="767084"/>
+            </a:xfrm>
+            <a:prstGeom prst="arc">
+              <a:avLst>
+                <a:gd name="adj1" fmla="val 17834694"/>
+                <a:gd name="adj2" fmla="val 0"/>
+              </a:avLst>
+            </a:prstGeom>
+            <a:ln w="12700">
+              <a:solidFill>
+                <a:schemeClr val="tx1"/>
+              </a:solidFill>
+              <a:headEnd type="arrow" w="sm" len="sm"/>
+              <a:tailEnd type="arrow" w="sm" len="sm"/>
+            </a:ln>
+          </p:spPr>
+          <p:style>
+            <a:lnRef idx="1">
+              <a:schemeClr val="accent1"/>
+            </a:lnRef>
+            <a:fillRef idx="0">
+              <a:schemeClr val="accent1"/>
+            </a:fillRef>
+            <a:effectRef idx="0">
+              <a:schemeClr val="accent1"/>
+            </a:effectRef>
+            <a:fontRef idx="minor">
+              <a:schemeClr val="tx1"/>
+            </a:fontRef>
+          </p:style>
+          <p:txBody>
+            <a:bodyPr rtlCol="0" anchor="ctr"/>
+            <a:lstStyle/>
+            <a:p>
+              <a:pPr algn="ctr"/>
+              <a:endParaRPr lang="en-US"/>
+            </a:p>
+          </p:txBody>
+        </p:sp>
+        <p:sp>
+          <p:nvSpPr>
+            <p:cNvPr id="36" name="Arc 35">
+              <a:extLst>
+                <a:ext uri="{FF2B5EF4-FFF2-40B4-BE49-F238E27FC236}">
+                  <a16:creationId xmlns:a16="http://schemas.microsoft.com/office/drawing/2014/main" id="{B3FAE778-66D2-46AF-937D-CE62E1E283EE}"/>
+                </a:ext>
+              </a:extLst>
+            </p:cNvPr>
+            <p:cNvSpPr/>
+            <p:nvPr/>
+          </p:nvSpPr>
+          <p:spPr>
+            <a:xfrm>
+              <a:off x="4320085" y="3181478"/>
+              <a:ext cx="743250" cy="767084"/>
+            </a:xfrm>
+            <a:prstGeom prst="arc">
+              <a:avLst>
+                <a:gd name="adj1" fmla="val 16223828"/>
+                <a:gd name="adj2" fmla="val 17835181"/>
+              </a:avLst>
+            </a:prstGeom>
+            <a:ln w="12700">
+              <a:solidFill>
+                <a:schemeClr val="tx1"/>
+              </a:solidFill>
+              <a:headEnd type="arrow" w="sm" len="sm"/>
+              <a:tailEnd type="arrow" w="sm" len="sm"/>
+            </a:ln>
+          </p:spPr>
+          <p:style>
+            <a:lnRef idx="1">
+              <a:schemeClr val="accent1"/>
+            </a:lnRef>
+            <a:fillRef idx="0">
+              <a:schemeClr val="accent1"/>
+            </a:fillRef>
+            <a:effectRef idx="0">
+              <a:schemeClr val="accent1"/>
+            </a:effectRef>
+            <a:fontRef idx="minor">
+              <a:schemeClr val="tx1"/>
+            </a:fontRef>
+          </p:style>
+          <p:txBody>
+            <a:bodyPr rtlCol="0" anchor="ctr"/>
+            <a:lstStyle/>
+            <a:p>
+              <a:pPr algn="ctr"/>
+              <a:endParaRPr lang="en-US"/>
+            </a:p>
+          </p:txBody>
+        </p:sp>
+      </p:grpSp>
+      <mc:AlternateContent xmlns:mc="http://schemas.openxmlformats.org/markup-compatibility/2006" xmlns:a14="http://schemas.microsoft.com/office/drawing/2010/main">
+        <mc:Choice Requires="a14">
+          <p:sp>
+            <p:nvSpPr>
+              <p:cNvPr id="37" name="TextBox theta" hidden="1">
+                <a:extLst>
+                  <a:ext uri="{FF2B5EF4-FFF2-40B4-BE49-F238E27FC236}">
+                    <a16:creationId xmlns:a16="http://schemas.microsoft.com/office/drawing/2014/main" id="{AEB6A9AA-10F4-4950-B248-0CB568C6F4A5}"/>
+                  </a:ext>
+                </a:extLst>
+              </p:cNvPr>
+              <p:cNvSpPr txBox="1"/>
+              <p:nvPr/>
+            </p:nvSpPr>
+            <p:spPr>
+              <a:xfrm>
+                <a:off x="4647905" y="2864628"/>
+                <a:ext cx="369454" cy="276999"/>
+              </a:xfrm>
+              <a:prstGeom prst="rect">
+                <a:avLst/>
+              </a:prstGeom>
+              <a:noFill/>
+            </p:spPr>
+            <p:txBody>
+              <a:bodyPr wrap="square" rtlCol="0">
+                <a:spAutoFit/>
+              </a:bodyPr>
+              <a:lstStyle/>
+              <a:p>
+                <a:pPr/>
+                <a14:m>
+                  <m:oMathPara xmlns:m="http://schemas.openxmlformats.org/officeDocument/2006/math">
+                    <m:oMathParaPr>
+                      <m:jc m:val="centerGroup"/>
+                    </m:oMathParaPr>
+                    <m:oMath xmlns:m="http://schemas.openxmlformats.org/officeDocument/2006/math">
+                      <m:r>
+                        <a:rPr lang="en-US" sz="1200" b="0" i="1" smtClean="0">
+                          <a:latin typeface="Cambria Math" panose="02040503050406030204" pitchFamily="18" charset="0"/>
+                        </a:rPr>
+                        <m:t>𝜃</m:t>
+                      </m:r>
+                    </m:oMath>
+                  </m:oMathPara>
+                </a14:m>
+                <a:endParaRPr lang="en-US" sz="1200" dirty="0"/>
+              </a:p>
+            </p:txBody>
+          </p:sp>
+        </mc:Choice>
+        <mc:Fallback xmlns="">
+          <p:sp>
+            <p:nvSpPr>
+              <p:cNvPr id="37" name="TextBox theta" hidden="1">
+                <a:extLst>
+                  <a:ext uri="{FF2B5EF4-FFF2-40B4-BE49-F238E27FC236}">
+                    <a16:creationId xmlns:a16="http://schemas.microsoft.com/office/drawing/2014/main" id="{AEB6A9AA-10F4-4950-B248-0CB568C6F4A5}"/>
+                  </a:ext>
+                </a:extLst>
+              </p:cNvPr>
+              <p:cNvSpPr txBox="1">
+                <a:spLocks noRot="1" noChangeAspect="1" noMove="1" noResize="1" noEditPoints="1" noAdjustHandles="1" noChangeArrowheads="1" noChangeShapeType="1" noTextEdit="1"/>
+              </p:cNvSpPr>
+              <p:nvPr/>
+            </p:nvSpPr>
+            <p:spPr>
+              <a:xfrm>
+                <a:off x="4647905" y="2864628"/>
+                <a:ext cx="369454" cy="276999"/>
+              </a:xfrm>
+              <a:prstGeom prst="rect">
+                <a:avLst/>
+              </a:prstGeom>
+              <a:blipFill>
+                <a:blip r:embed="rId5"/>
+                <a:stretch>
+                  <a:fillRect/>
+                </a:stretch>
+              </a:blipFill>
+            </p:spPr>
+            <p:txBody>
+              <a:bodyPr/>
+              <a:lstStyle/>
+              <a:p>
+                <a:r>
+                  <a:rPr lang="en-US">
+                    <a:noFill/>
+                  </a:rPr>
+                  <a:t> </a:t>
+                </a:r>
+              </a:p>
+            </p:txBody>
+          </p:sp>
+        </mc:Fallback>
+      </mc:AlternateContent>
+      <mc:AlternateContent xmlns:mc="http://schemas.openxmlformats.org/markup-compatibility/2006" xmlns:a14="http://schemas.microsoft.com/office/drawing/2010/main">
+        <mc:Choice Requires="a14">
+          <p:sp>
+            <p:nvSpPr>
+              <p:cNvPr id="38" name="TextBox 90 - theta" hidden="1">
+                <a:extLst>
+                  <a:ext uri="{FF2B5EF4-FFF2-40B4-BE49-F238E27FC236}">
+                    <a16:creationId xmlns:a16="http://schemas.microsoft.com/office/drawing/2014/main" id="{3F736BEB-6FB0-46E0-B4F3-8E3EEC31FD98}"/>
+                  </a:ext>
+                </a:extLst>
+              </p:cNvPr>
+              <p:cNvSpPr txBox="1"/>
+              <p:nvPr/>
+            </p:nvSpPr>
+            <p:spPr>
+              <a:xfrm>
+                <a:off x="5029157" y="3184843"/>
+                <a:ext cx="747220" cy="276999"/>
+              </a:xfrm>
+              <a:prstGeom prst="rect">
+                <a:avLst/>
+              </a:prstGeom>
+              <a:noFill/>
+            </p:spPr>
+            <p:txBody>
+              <a:bodyPr wrap="square" rtlCol="0">
+                <a:spAutoFit/>
+              </a:bodyPr>
+              <a:lstStyle/>
+              <a:p>
+                <a:pPr/>
+                <a14:m>
+                  <m:oMathPara xmlns:m="http://schemas.openxmlformats.org/officeDocument/2006/math">
+                    <m:oMathParaPr>
+                      <m:jc m:val="centerGroup"/>
+                    </m:oMathParaPr>
+                    <m:oMath xmlns:m="http://schemas.openxmlformats.org/officeDocument/2006/math">
+                      <m:r>
+                        <a:rPr lang="en-US" sz="1200" b="0" i="1" smtClean="0">
+                          <a:latin typeface="Cambria Math" panose="02040503050406030204" pitchFamily="18" charset="0"/>
+                        </a:rPr>
+                        <m:t>90</m:t>
+                      </m:r>
+                      <m:r>
+                        <a:rPr lang="en-US" sz="1200" b="0" i="1" smtClean="0">
+                          <a:latin typeface="Cambria Math" panose="02040503050406030204" pitchFamily="18" charset="0"/>
+                          <a:ea typeface="Cambria Math" panose="02040503050406030204" pitchFamily="18" charset="0"/>
+                        </a:rPr>
+                        <m:t>°−</m:t>
+                      </m:r>
+                      <m:r>
+                        <a:rPr lang="en-US" sz="1200" b="0" i="1" smtClean="0">
+                          <a:latin typeface="Cambria Math" panose="02040503050406030204" pitchFamily="18" charset="0"/>
+                        </a:rPr>
+                        <m:t>𝜃</m:t>
+                      </m:r>
+                    </m:oMath>
+                  </m:oMathPara>
+                </a14:m>
+                <a:endParaRPr lang="en-US" sz="1200" dirty="0"/>
+              </a:p>
+            </p:txBody>
+          </p:sp>
+        </mc:Choice>
+        <mc:Fallback xmlns="">
+          <p:sp>
+            <p:nvSpPr>
+              <p:cNvPr id="38" name="TextBox 90 - theta" hidden="1">
+                <a:extLst>
+                  <a:ext uri="{FF2B5EF4-FFF2-40B4-BE49-F238E27FC236}">
+                    <a16:creationId xmlns:a16="http://schemas.microsoft.com/office/drawing/2014/main" id="{3F736BEB-6FB0-46E0-B4F3-8E3EEC31FD98}"/>
+                  </a:ext>
+                </a:extLst>
+              </p:cNvPr>
+              <p:cNvSpPr txBox="1">
+                <a:spLocks noRot="1" noChangeAspect="1" noMove="1" noResize="1" noEditPoints="1" noAdjustHandles="1" noChangeArrowheads="1" noChangeShapeType="1" noTextEdit="1"/>
+              </p:cNvSpPr>
+              <p:nvPr/>
+            </p:nvSpPr>
+            <p:spPr>
+              <a:xfrm>
+                <a:off x="5029157" y="3184843"/>
+                <a:ext cx="747220" cy="276999"/>
+              </a:xfrm>
+              <a:prstGeom prst="rect">
+                <a:avLst/>
+              </a:prstGeom>
+              <a:blipFill>
+                <a:blip r:embed="rId6"/>
+                <a:stretch>
+                  <a:fillRect/>
+                </a:stretch>
+              </a:blipFill>
+            </p:spPr>
+            <p:txBody>
+              <a:bodyPr/>
+              <a:lstStyle/>
+              <a:p>
+                <a:r>
+                  <a:rPr lang="en-US">
+                    <a:noFill/>
+                  </a:rPr>
+                  <a:t> </a:t>
+                </a:r>
+              </a:p>
+            </p:txBody>
+          </p:sp>
+        </mc:Fallback>
+      </mc:AlternateContent>
+      <mc:AlternateContent xmlns:mc="http://schemas.openxmlformats.org/markup-compatibility/2006" xmlns:a14="http://schemas.microsoft.com/office/drawing/2010/main">
+        <mc:Choice Requires="a14">
+          <p:sp>
+            <p:nvSpPr>
+              <p:cNvPr id="39" name="textbox v_c" hidden="1">
+                <a:extLst>
+                  <a:ext uri="{FF2B5EF4-FFF2-40B4-BE49-F238E27FC236}">
+                    <a16:creationId xmlns:a16="http://schemas.microsoft.com/office/drawing/2014/main" id="{3B6472A9-FB04-4C20-BE87-2CBAE883A22B}"/>
+                  </a:ext>
+                </a:extLst>
+              </p:cNvPr>
+              <p:cNvSpPr txBox="1"/>
+              <p:nvPr/>
+            </p:nvSpPr>
+            <p:spPr>
+              <a:xfrm>
+                <a:off x="4111218" y="1354210"/>
                 <a:ext cx="369454" cy="261610"/>
               </a:xfrm>
               <a:prstGeom prst="rect">
@@ -3507,6 +4500,703 @@
               </a:bodyPr>
               <a:lstStyle/>
               <a:p>
+                <a:pPr/>
+                <a14:m>
+                  <m:oMathPara xmlns:m="http://schemas.openxmlformats.org/officeDocument/2006/math">
+                    <m:oMathParaPr>
+                      <m:jc m:val="centerGroup"/>
+                    </m:oMathParaPr>
+                    <m:oMath xmlns:m="http://schemas.openxmlformats.org/officeDocument/2006/math">
+                      <m:sSub>
+                        <m:sSubPr>
+                          <m:ctrlPr>
+                            <a:rPr lang="en-US" sz="1100" b="0" i="1" smtClean="0">
+                              <a:latin typeface="Cambria Math" panose="02040503050406030204" pitchFamily="18" charset="0"/>
+                            </a:rPr>
+                          </m:ctrlPr>
+                        </m:sSubPr>
+                        <m:e>
+                          <m:acc>
+                            <m:accPr>
+                              <m:chr m:val="⃗"/>
+                              <m:ctrlPr>
+                                <a:rPr lang="en-US" sz="1100" i="1" smtClean="0">
+                                  <a:latin typeface="Cambria Math" panose="02040503050406030204" pitchFamily="18" charset="0"/>
+                                </a:rPr>
+                              </m:ctrlPr>
+                            </m:accPr>
+                            <m:e>
+                              <m:r>
+                                <a:rPr lang="en-US" sz="1100" b="0" i="1" smtClean="0">
+                                  <a:latin typeface="Cambria Math" panose="02040503050406030204" pitchFamily="18" charset="0"/>
+                                </a:rPr>
+                                <m:t>𝑣</m:t>
+                              </m:r>
+                            </m:e>
+                          </m:acc>
+                        </m:e>
+                        <m:sub>
+                          <m:r>
+                            <a:rPr lang="en-US" sz="1100" b="0" i="1" smtClean="0">
+                              <a:latin typeface="Cambria Math" panose="02040503050406030204" pitchFamily="18" charset="0"/>
+                            </a:rPr>
+                            <m:t>𝐶</m:t>
+                          </m:r>
+                        </m:sub>
+                      </m:sSub>
+                    </m:oMath>
+                  </m:oMathPara>
+                </a14:m>
+                <a:endParaRPr lang="en-US" sz="1100" dirty="0"/>
+              </a:p>
+            </p:txBody>
+          </p:sp>
+        </mc:Choice>
+        <mc:Fallback xmlns="">
+          <p:sp>
+            <p:nvSpPr>
+              <p:cNvPr id="39" name="textbox v_c" hidden="1">
+                <a:extLst>
+                  <a:ext uri="{FF2B5EF4-FFF2-40B4-BE49-F238E27FC236}">
+                    <a16:creationId xmlns:a16="http://schemas.microsoft.com/office/drawing/2014/main" id="{3B6472A9-FB04-4C20-BE87-2CBAE883A22B}"/>
+                  </a:ext>
+                </a:extLst>
+              </p:cNvPr>
+              <p:cNvSpPr txBox="1">
+                <a:spLocks noRot="1" noChangeAspect="1" noMove="1" noResize="1" noEditPoints="1" noAdjustHandles="1" noChangeArrowheads="1" noChangeShapeType="1" noTextEdit="1"/>
+              </p:cNvSpPr>
+              <p:nvPr/>
+            </p:nvSpPr>
+            <p:spPr>
+              <a:xfrm>
+                <a:off x="4111218" y="1354210"/>
+                <a:ext cx="369454" cy="261610"/>
+              </a:xfrm>
+              <a:prstGeom prst="rect">
+                <a:avLst/>
+              </a:prstGeom>
+              <a:blipFill>
+                <a:blip r:embed="rId7"/>
+                <a:stretch>
+                  <a:fillRect t="-2326" r="-3279"/>
+                </a:stretch>
+              </a:blipFill>
+            </p:spPr>
+            <p:txBody>
+              <a:bodyPr/>
+              <a:lstStyle/>
+              <a:p>
+                <a:r>
+                  <a:rPr lang="en-US">
+                    <a:noFill/>
+                  </a:rPr>
+                  <a:t> </a:t>
+                </a:r>
+              </a:p>
+            </p:txBody>
+          </p:sp>
+        </mc:Fallback>
+      </mc:AlternateContent>
+      <mc:AlternateContent xmlns:mc="http://schemas.openxmlformats.org/markup-compatibility/2006" xmlns:a14="http://schemas.microsoft.com/office/drawing/2010/main">
+        <mc:Choice Requires="a14">
+          <p:sp>
+            <p:nvSpPr>
+              <p:cNvPr id="40" name="textbox v_b" hidden="1">
+                <a:extLst>
+                  <a:ext uri="{FF2B5EF4-FFF2-40B4-BE49-F238E27FC236}">
+                    <a16:creationId xmlns:a16="http://schemas.microsoft.com/office/drawing/2014/main" id="{8B316C6F-D447-4C2C-9F72-5938BCD41CFB}"/>
+                  </a:ext>
+                </a:extLst>
+              </p:cNvPr>
+              <p:cNvSpPr txBox="1"/>
+              <p:nvPr/>
+            </p:nvSpPr>
+            <p:spPr>
+              <a:xfrm>
+                <a:off x="5181375" y="2364168"/>
+                <a:ext cx="369454" cy="261610"/>
+              </a:xfrm>
+              <a:prstGeom prst="rect">
+                <a:avLst/>
+              </a:prstGeom>
+              <a:noFill/>
+            </p:spPr>
+            <p:txBody>
+              <a:bodyPr wrap="square" rtlCol="0">
+                <a:spAutoFit/>
+              </a:bodyPr>
+              <a:lstStyle/>
+              <a:p>
+                <a:pPr/>
+                <a14:m>
+                  <m:oMathPara xmlns:m="http://schemas.openxmlformats.org/officeDocument/2006/math">
+                    <m:oMathParaPr>
+                      <m:jc m:val="centerGroup"/>
+                    </m:oMathParaPr>
+                    <m:oMath xmlns:m="http://schemas.openxmlformats.org/officeDocument/2006/math">
+                      <m:sSub>
+                        <m:sSubPr>
+                          <m:ctrlPr>
+                            <a:rPr lang="en-US" sz="1100" b="0" i="1" smtClean="0">
+                              <a:latin typeface="Cambria Math" panose="02040503050406030204" pitchFamily="18" charset="0"/>
+                            </a:rPr>
+                          </m:ctrlPr>
+                        </m:sSubPr>
+                        <m:e>
+                          <m:acc>
+                            <m:accPr>
+                              <m:chr m:val="⃗"/>
+                              <m:ctrlPr>
+                                <a:rPr lang="en-US" sz="1100" i="1" smtClean="0">
+                                  <a:latin typeface="Cambria Math" panose="02040503050406030204" pitchFamily="18" charset="0"/>
+                                </a:rPr>
+                              </m:ctrlPr>
+                            </m:accPr>
+                            <m:e>
+                              <m:r>
+                                <a:rPr lang="en-US" sz="1100" b="0" i="1" smtClean="0">
+                                  <a:latin typeface="Cambria Math" panose="02040503050406030204" pitchFamily="18" charset="0"/>
+                                </a:rPr>
+                                <m:t>𝑣</m:t>
+                              </m:r>
+                            </m:e>
+                          </m:acc>
+                        </m:e>
+                        <m:sub>
+                          <m:r>
+                            <a:rPr lang="en-US" sz="1100" b="0" i="1" smtClean="0">
+                              <a:latin typeface="Cambria Math" panose="02040503050406030204" pitchFamily="18" charset="0"/>
+                            </a:rPr>
+                            <m:t>𝐵</m:t>
+                          </m:r>
+                        </m:sub>
+                      </m:sSub>
+                    </m:oMath>
+                  </m:oMathPara>
+                </a14:m>
+                <a:endParaRPr lang="en-US" sz="1100" dirty="0"/>
+              </a:p>
+            </p:txBody>
+          </p:sp>
+        </mc:Choice>
+        <mc:Fallback xmlns="">
+          <p:sp>
+            <p:nvSpPr>
+              <p:cNvPr id="40" name="textbox v_b" hidden="1">
+                <a:extLst>
+                  <a:ext uri="{FF2B5EF4-FFF2-40B4-BE49-F238E27FC236}">
+                    <a16:creationId xmlns:a16="http://schemas.microsoft.com/office/drawing/2014/main" id="{8B316C6F-D447-4C2C-9F72-5938BCD41CFB}"/>
+                  </a:ext>
+                </a:extLst>
+              </p:cNvPr>
+              <p:cNvSpPr txBox="1">
+                <a:spLocks noRot="1" noChangeAspect="1" noMove="1" noResize="1" noEditPoints="1" noAdjustHandles="1" noChangeArrowheads="1" noChangeShapeType="1" noTextEdit="1"/>
+              </p:cNvSpPr>
+              <p:nvPr/>
+            </p:nvSpPr>
+            <p:spPr>
+              <a:xfrm>
+                <a:off x="5181375" y="2364168"/>
+                <a:ext cx="369454" cy="261610"/>
+              </a:xfrm>
+              <a:prstGeom prst="rect">
+                <a:avLst/>
+              </a:prstGeom>
+              <a:blipFill>
+                <a:blip r:embed="rId8"/>
+                <a:stretch>
+                  <a:fillRect t="-2326" r="-1639"/>
+                </a:stretch>
+              </a:blipFill>
+            </p:spPr>
+            <p:txBody>
+              <a:bodyPr/>
+              <a:lstStyle/>
+              <a:p>
+                <a:r>
+                  <a:rPr lang="en-US">
+                    <a:noFill/>
+                  </a:rPr>
+                  <a:t> </a:t>
+                </a:r>
+              </a:p>
+            </p:txBody>
+          </p:sp>
+        </mc:Fallback>
+      </mc:AlternateContent>
+      <p:sp>
+        <p:nvSpPr>
+          <p:cNvPr id="47" name="Arc 46" hidden="1">
+            <a:extLst>
+              <a:ext uri="{FF2B5EF4-FFF2-40B4-BE49-F238E27FC236}">
+                <a16:creationId xmlns:a16="http://schemas.microsoft.com/office/drawing/2014/main" id="{FD9D2BE2-0287-41C5-8A61-B2A95FD0E48A}"/>
+              </a:ext>
+            </a:extLst>
+          </p:cNvPr>
+          <p:cNvSpPr/>
+          <p:nvPr/>
+        </p:nvSpPr>
+        <p:spPr>
+          <a:xfrm flipH="1">
+            <a:off x="4235169" y="2077143"/>
+            <a:ext cx="914400" cy="914400"/>
+          </a:xfrm>
+          <a:prstGeom prst="arc">
+            <a:avLst>
+              <a:gd name="adj1" fmla="val 16223828"/>
+              <a:gd name="adj2" fmla="val 18076305"/>
+            </a:avLst>
+          </a:prstGeom>
+          <a:ln w="12700">
+            <a:solidFill>
+              <a:schemeClr val="tx1"/>
+            </a:solidFill>
+            <a:headEnd type="arrow" w="sm" len="sm"/>
+            <a:tailEnd type="arrow" w="sm" len="sm"/>
+          </a:ln>
+        </p:spPr>
+        <p:style>
+          <a:lnRef idx="1">
+            <a:schemeClr val="accent1"/>
+          </a:lnRef>
+          <a:fillRef idx="0">
+            <a:schemeClr val="accent1"/>
+          </a:fillRef>
+          <a:effectRef idx="0">
+            <a:schemeClr val="accent1"/>
+          </a:effectRef>
+          <a:fontRef idx="minor">
+            <a:schemeClr val="tx1"/>
+          </a:fontRef>
+        </p:style>
+        <p:txBody>
+          <a:bodyPr rtlCol="0" anchor="ctr"/>
+          <a:lstStyle/>
+          <a:p>
+            <a:pPr algn="ctr"/>
+            <a:endParaRPr lang="en-US"/>
+          </a:p>
+        </p:txBody>
+      </p:sp>
+      <mc:AlternateContent xmlns:mc="http://schemas.openxmlformats.org/markup-compatibility/2006" xmlns:a14="http://schemas.microsoft.com/office/drawing/2010/main">
+        <mc:Choice Requires="a14">
+          <p:sp>
+            <p:nvSpPr>
+              <p:cNvPr id="48" name="TextBox theta" hidden="1">
+                <a:extLst>
+                  <a:ext uri="{FF2B5EF4-FFF2-40B4-BE49-F238E27FC236}">
+                    <a16:creationId xmlns:a16="http://schemas.microsoft.com/office/drawing/2014/main" id="{2F1806AA-D03B-4887-98DC-B0BE5F046686}"/>
+                  </a:ext>
+                </a:extLst>
+              </p:cNvPr>
+              <p:cNvSpPr txBox="1"/>
+              <p:nvPr/>
+            </p:nvSpPr>
+            <p:spPr>
+              <a:xfrm>
+                <a:off x="4372088" y="1870785"/>
+                <a:ext cx="369454" cy="276999"/>
+              </a:xfrm>
+              <a:prstGeom prst="rect">
+                <a:avLst/>
+              </a:prstGeom>
+              <a:noFill/>
+            </p:spPr>
+            <p:txBody>
+              <a:bodyPr wrap="square" rtlCol="0">
+                <a:spAutoFit/>
+              </a:bodyPr>
+              <a:lstStyle/>
+              <a:p>
+                <a:pPr/>
+                <a14:m>
+                  <m:oMathPara xmlns:m="http://schemas.openxmlformats.org/officeDocument/2006/math">
+                    <m:oMathParaPr>
+                      <m:jc m:val="centerGroup"/>
+                    </m:oMathParaPr>
+                    <m:oMath xmlns:m="http://schemas.openxmlformats.org/officeDocument/2006/math">
+                      <m:r>
+                        <a:rPr lang="en-US" sz="1200" b="0" i="1" smtClean="0">
+                          <a:latin typeface="Cambria Math" panose="02040503050406030204" pitchFamily="18" charset="0"/>
+                        </a:rPr>
+                        <m:t>𝜃</m:t>
+                      </m:r>
+                    </m:oMath>
+                  </m:oMathPara>
+                </a14:m>
+                <a:endParaRPr lang="en-US" sz="1200" dirty="0"/>
+              </a:p>
+            </p:txBody>
+          </p:sp>
+        </mc:Choice>
+        <mc:Fallback xmlns="">
+          <p:sp>
+            <p:nvSpPr>
+              <p:cNvPr id="48" name="TextBox theta" hidden="1">
+                <a:extLst>
+                  <a:ext uri="{FF2B5EF4-FFF2-40B4-BE49-F238E27FC236}">
+                    <a16:creationId xmlns:a16="http://schemas.microsoft.com/office/drawing/2014/main" id="{2F1806AA-D03B-4887-98DC-B0BE5F046686}"/>
+                  </a:ext>
+                </a:extLst>
+              </p:cNvPr>
+              <p:cNvSpPr txBox="1">
+                <a:spLocks noRot="1" noChangeAspect="1" noMove="1" noResize="1" noEditPoints="1" noAdjustHandles="1" noChangeArrowheads="1" noChangeShapeType="1" noTextEdit="1"/>
+              </p:cNvSpPr>
+              <p:nvPr/>
+            </p:nvSpPr>
+            <p:spPr>
+              <a:xfrm>
+                <a:off x="4372088" y="1870785"/>
+                <a:ext cx="369454" cy="276999"/>
+              </a:xfrm>
+              <a:prstGeom prst="rect">
+                <a:avLst/>
+              </a:prstGeom>
+              <a:blipFill>
+                <a:blip r:embed="rId5"/>
+                <a:stretch>
+                  <a:fillRect/>
+                </a:stretch>
+              </a:blipFill>
+            </p:spPr>
+            <p:txBody>
+              <a:bodyPr/>
+              <a:lstStyle/>
+              <a:p>
+                <a:r>
+                  <a:rPr lang="en-US">
+                    <a:noFill/>
+                  </a:rPr>
+                  <a:t> </a:t>
+                </a:r>
+              </a:p>
+            </p:txBody>
+          </p:sp>
+        </mc:Fallback>
+      </mc:AlternateContent>
+    </p:spTree>
+    <p:extLst>
+      <p:ext uri="{BB962C8B-B14F-4D97-AF65-F5344CB8AC3E}">
+        <p14:creationId xmlns:p14="http://schemas.microsoft.com/office/powerpoint/2010/main" val="3099902739"/>
+      </p:ext>
+    </p:extLst>
+  </p:cSld>
+  <p:clrMapOvr>
+    <a:masterClrMapping/>
+  </p:clrMapOvr>
+</p:sld>
+</file>
+
+<file path=ppt/slides/slide2.xml><?xml version="1.0" encoding="utf-8"?>
+<p:sld xmlns:a="http://schemas.openxmlformats.org/drawingml/2006/main" xmlns:r="http://schemas.openxmlformats.org/officeDocument/2006/relationships" xmlns:p="http://schemas.openxmlformats.org/presentationml/2006/main">
+  <p:cSld>
+    <p:spTree>
+      <p:nvGrpSpPr>
+        <p:cNvPr id="1" name=""/>
+        <p:cNvGrpSpPr/>
+        <p:nvPr/>
+      </p:nvGrpSpPr>
+      <p:grpSpPr>
+        <a:xfrm>
+          <a:off x="0" y="0"/>
+          <a:ext cx="0" cy="0"/>
+          <a:chOff x="0" y="0"/>
+          <a:chExt cx="0" cy="0"/>
+        </a:xfrm>
+      </p:grpSpPr>
+      <p:cxnSp>
+        <p:nvCxnSpPr>
+          <p:cNvPr id="5" name="x axis"/>
+          <p:cNvCxnSpPr/>
+          <p:nvPr/>
+        </p:nvCxnSpPr>
+        <p:spPr>
+          <a:xfrm>
+            <a:off x="1939636" y="3066473"/>
+            <a:ext cx="3657600" cy="0"/>
+          </a:xfrm>
+          <a:prstGeom prst="line">
+            <a:avLst/>
+          </a:prstGeom>
+          <a:ln>
+            <a:solidFill>
+              <a:schemeClr val="tx1"/>
+            </a:solidFill>
+            <a:headEnd type="arrow" w="med" len="med"/>
+            <a:tailEnd type="arrow" w="med" len="med"/>
+          </a:ln>
+        </p:spPr>
+        <p:style>
+          <a:lnRef idx="1">
+            <a:schemeClr val="accent1"/>
+          </a:lnRef>
+          <a:fillRef idx="0">
+            <a:schemeClr val="accent1"/>
+          </a:fillRef>
+          <a:effectRef idx="0">
+            <a:schemeClr val="accent1"/>
+          </a:effectRef>
+          <a:fontRef idx="minor">
+            <a:schemeClr val="tx1"/>
+          </a:fontRef>
+        </p:style>
+      </p:cxnSp>
+      <p:cxnSp>
+        <p:nvCxnSpPr>
+          <p:cNvPr id="7" name="y axis"/>
+          <p:cNvCxnSpPr/>
+          <p:nvPr/>
+        </p:nvCxnSpPr>
+        <p:spPr>
+          <a:xfrm>
+            <a:off x="3768436" y="1237673"/>
+            <a:ext cx="0" cy="3657600"/>
+          </a:xfrm>
+          <a:prstGeom prst="line">
+            <a:avLst/>
+          </a:prstGeom>
+          <a:ln>
+            <a:solidFill>
+              <a:schemeClr val="tx1"/>
+            </a:solidFill>
+            <a:headEnd type="arrow" w="med" len="med"/>
+            <a:tailEnd type="arrow" w="med" len="med"/>
+          </a:ln>
+        </p:spPr>
+        <p:style>
+          <a:lnRef idx="1">
+            <a:schemeClr val="accent1"/>
+          </a:lnRef>
+          <a:fillRef idx="0">
+            <a:schemeClr val="accent1"/>
+          </a:fillRef>
+          <a:effectRef idx="0">
+            <a:schemeClr val="accent1"/>
+          </a:effectRef>
+          <a:fontRef idx="minor">
+            <a:schemeClr val="tx1"/>
+          </a:fontRef>
+        </p:style>
+      </p:cxnSp>
+      <p:sp>
+        <p:nvSpPr>
+          <p:cNvPr id="50" name="track">
+            <a:extLst>
+              <a:ext uri="{FF2B5EF4-FFF2-40B4-BE49-F238E27FC236}">
+                <a16:creationId xmlns:a16="http://schemas.microsoft.com/office/drawing/2014/main" id="{9AD964EC-16A8-4C20-8CB7-E828C91AD26D}"/>
+              </a:ext>
+            </a:extLst>
+          </p:cNvPr>
+          <p:cNvSpPr/>
+          <p:nvPr/>
+        </p:nvSpPr>
+        <p:spPr>
+          <a:xfrm>
+            <a:off x="2624049" y="1923473"/>
+            <a:ext cx="2287814" cy="2287810"/>
+          </a:xfrm>
+          <a:prstGeom prst="donut">
+            <a:avLst>
+              <a:gd name="adj" fmla="val 9669"/>
+            </a:avLst>
+          </a:prstGeom>
+          <a:solidFill>
+            <a:schemeClr val="bg1">
+              <a:lumMod val="95000"/>
+            </a:schemeClr>
+          </a:solidFill>
+          <a:ln w="19050">
+            <a:solidFill>
+              <a:schemeClr val="bg1">
+                <a:lumMod val="75000"/>
+              </a:schemeClr>
+            </a:solidFill>
+          </a:ln>
+        </p:spPr>
+        <p:style>
+          <a:lnRef idx="2">
+            <a:schemeClr val="accent1">
+              <a:shade val="50000"/>
+            </a:schemeClr>
+          </a:lnRef>
+          <a:fillRef idx="1">
+            <a:schemeClr val="accent1"/>
+          </a:fillRef>
+          <a:effectRef idx="0">
+            <a:schemeClr val="accent1"/>
+          </a:effectRef>
+          <a:fontRef idx="minor">
+            <a:schemeClr val="lt1"/>
+          </a:fontRef>
+        </p:style>
+        <p:txBody>
+          <a:bodyPr rtlCol="0" anchor="ctr"/>
+          <a:lstStyle/>
+          <a:p>
+            <a:pPr algn="ctr"/>
+            <a:endParaRPr lang="en-US"/>
+          </a:p>
+        </p:txBody>
+      </p:sp>
+      <p:sp>
+        <p:nvSpPr>
+          <p:cNvPr id="8" name="250 m"/>
+          <p:cNvSpPr txBox="1"/>
+          <p:nvPr/>
+        </p:nvSpPr>
+        <p:spPr>
+          <a:xfrm rot="19888679">
+            <a:off x="3977197" y="2555262"/>
+            <a:ext cx="628072" cy="446276"/>
+          </a:xfrm>
+          <a:prstGeom prst="rect">
+            <a:avLst/>
+          </a:prstGeom>
+          <a:noFill/>
+        </p:spPr>
+        <p:txBody>
+          <a:bodyPr wrap="square" rtlCol="0">
+            <a:spAutoFit/>
+          </a:bodyPr>
+          <a:lstStyle/>
+          <a:p>
+            <a:r>
+              <a:rPr lang="en-US" sz="1200" dirty="0">
+                <a:solidFill>
+                  <a:schemeClr val="bg1">
+                    <a:lumMod val="75000"/>
+                  </a:schemeClr>
+                </a:solidFill>
+              </a:rPr>
+              <a:t>250</a:t>
+            </a:r>
+            <a:r>
+              <a:rPr lang="en-US" sz="1100" dirty="0">
+                <a:solidFill>
+                  <a:schemeClr val="bg1">
+                    <a:lumMod val="75000"/>
+                  </a:schemeClr>
+                </a:solidFill>
+              </a:rPr>
+              <a:t> m</a:t>
+            </a:r>
+          </a:p>
+          <a:p>
+            <a:endParaRPr lang="en-US" sz="1100" dirty="0">
+              <a:solidFill>
+                <a:schemeClr val="bg1">
+                  <a:lumMod val="75000"/>
+                </a:schemeClr>
+              </a:solidFill>
+            </a:endParaRPr>
+          </a:p>
+        </p:txBody>
+      </p:sp>
+      <p:cxnSp>
+        <p:nvCxnSpPr>
+          <p:cNvPr id="10" name="Straight Connector 9"/>
+          <p:cNvCxnSpPr>
+            <a:cxnSpLocks/>
+          </p:cNvCxnSpPr>
+          <p:nvPr/>
+        </p:nvCxnSpPr>
+        <p:spPr>
+          <a:xfrm flipV="1">
+            <a:off x="3768436" y="2622087"/>
+            <a:ext cx="877379" cy="438692"/>
+          </a:xfrm>
+          <a:prstGeom prst="line">
+            <a:avLst/>
+          </a:prstGeom>
+          <a:ln w="12700">
+            <a:solidFill>
+              <a:schemeClr val="bg1">
+                <a:lumMod val="75000"/>
+              </a:schemeClr>
+            </a:solidFill>
+            <a:prstDash val="dash"/>
+          </a:ln>
+        </p:spPr>
+        <p:style>
+          <a:lnRef idx="1">
+            <a:schemeClr val="accent1"/>
+          </a:lnRef>
+          <a:fillRef idx="0">
+            <a:schemeClr val="accent1"/>
+          </a:fillRef>
+          <a:effectRef idx="0">
+            <a:schemeClr val="accent1"/>
+          </a:effectRef>
+          <a:fontRef idx="minor">
+            <a:schemeClr val="tx1"/>
+          </a:fontRef>
+        </p:style>
+      </p:cxnSp>
+      <p:cxnSp>
+        <p:nvCxnSpPr>
+          <p:cNvPr id="12" name="Straight Connector 11"/>
+          <p:cNvCxnSpPr>
+            <a:cxnSpLocks/>
+          </p:cNvCxnSpPr>
+          <p:nvPr/>
+        </p:nvCxnSpPr>
+        <p:spPr>
+          <a:xfrm>
+            <a:off x="3768435" y="3070617"/>
+            <a:ext cx="850745" cy="425373"/>
+          </a:xfrm>
+          <a:prstGeom prst="line">
+            <a:avLst/>
+          </a:prstGeom>
+          <a:ln w="12700">
+            <a:solidFill>
+              <a:schemeClr val="bg1">
+                <a:lumMod val="75000"/>
+              </a:schemeClr>
+            </a:solidFill>
+            <a:prstDash val="dash"/>
+          </a:ln>
+        </p:spPr>
+        <p:style>
+          <a:lnRef idx="1">
+            <a:schemeClr val="accent1"/>
+          </a:lnRef>
+          <a:fillRef idx="0">
+            <a:schemeClr val="accent1"/>
+          </a:fillRef>
+          <a:effectRef idx="0">
+            <a:schemeClr val="accent1"/>
+          </a:effectRef>
+          <a:fontRef idx="minor">
+            <a:schemeClr val="tx1"/>
+          </a:fontRef>
+        </p:style>
+      </p:cxnSp>
+      <mc:AlternateContent xmlns:mc="http://schemas.openxmlformats.org/markup-compatibility/2006" xmlns:a14="http://schemas.microsoft.com/office/drawing/2010/main">
+        <mc:Choice Requires="a14">
+          <p:sp>
+            <p:nvSpPr>
+              <p:cNvPr id="13" name="x"/>
+              <p:cNvSpPr txBox="1"/>
+              <p:nvPr/>
+            </p:nvSpPr>
+            <p:spPr>
+              <a:xfrm>
+                <a:off x="5513371" y="2941236"/>
+                <a:ext cx="369454" cy="261610"/>
+              </a:xfrm>
+              <a:prstGeom prst="rect">
+                <a:avLst/>
+              </a:prstGeom>
+              <a:noFill/>
+            </p:spPr>
+            <p:txBody>
+              <a:bodyPr wrap="square" rtlCol="0">
+                <a:spAutoFit/>
+              </a:bodyPr>
+              <a:lstStyle/>
+              <a:p>
+                <a:pPr/>
                 <a14:m>
                   <m:oMathPara xmlns:m="http://schemas.openxmlformats.org/officeDocument/2006/math">
                     <m:oMathParaPr>
@@ -3517,7 +5207,7 @@
                         <a:rPr lang="en-US" sz="1100" b="0" i="1" smtClean="0">
                           <a:latin typeface="Cambria Math" panose="02040503050406030204" pitchFamily="18" charset="0"/>
                         </a:rPr>
-                        <m:t>𝜃</m:t>
+                        <m:t>𝑥</m:t>
                       </m:r>
                     </m:oMath>
                   </m:oMathPara>
@@ -3527,10 +5217,10 @@
             </p:txBody>
           </p:sp>
         </mc:Choice>
-        <mc:Fallback>
+        <mc:Fallback xmlns="">
           <p:sp>
             <p:nvSpPr>
-              <p:cNvPr id="16" name="TextBox 15"/>
+              <p:cNvPr id="13" name="x"/>
               <p:cNvSpPr txBox="1">
                 <a:spLocks noRot="1" noChangeAspect="1" noMove="1" noResize="1" noEditPoints="1" noAdjustHandles="1" noChangeArrowheads="1" noChangeShapeType="1" noTextEdit="1"/>
               </p:cNvSpPr>
@@ -3538,8 +5228,187 @@
             </p:nvSpPr>
             <p:spPr>
               <a:xfrm>
-                <a:off x="3916220" y="2857805"/>
+                <a:off x="5513371" y="2941236"/>
                 <a:ext cx="369454" cy="261610"/>
+              </a:xfrm>
+              <a:prstGeom prst="rect">
+                <a:avLst/>
+              </a:prstGeom>
+              <a:blipFill>
+                <a:blip r:embed="rId2"/>
+                <a:stretch>
+                  <a:fillRect/>
+                </a:stretch>
+              </a:blipFill>
+            </p:spPr>
+            <p:txBody>
+              <a:bodyPr/>
+              <a:lstStyle/>
+              <a:p>
+                <a:r>
+                  <a:rPr lang="en-US">
+                    <a:noFill/>
+                  </a:rPr>
+                  <a:t> </a:t>
+                </a:r>
+              </a:p>
+            </p:txBody>
+          </p:sp>
+        </mc:Fallback>
+      </mc:AlternateContent>
+      <mc:AlternateContent xmlns:mc="http://schemas.openxmlformats.org/markup-compatibility/2006" xmlns:a14="http://schemas.microsoft.com/office/drawing/2010/main">
+        <mc:Choice Requires="a14">
+          <p:sp>
+            <p:nvSpPr>
+              <p:cNvPr id="14" name="y"/>
+              <p:cNvSpPr txBox="1"/>
+              <p:nvPr/>
+            </p:nvSpPr>
+            <p:spPr>
+              <a:xfrm>
+                <a:off x="3436882" y="1223405"/>
+                <a:ext cx="369454" cy="261610"/>
+              </a:xfrm>
+              <a:prstGeom prst="rect">
+                <a:avLst/>
+              </a:prstGeom>
+              <a:noFill/>
+            </p:spPr>
+            <p:txBody>
+              <a:bodyPr wrap="square" rtlCol="0">
+                <a:spAutoFit/>
+              </a:bodyPr>
+              <a:lstStyle/>
+              <a:p>
+                <a:pPr/>
+                <a14:m>
+                  <m:oMathPara xmlns:m="http://schemas.openxmlformats.org/officeDocument/2006/math">
+                    <m:oMathParaPr>
+                      <m:jc m:val="centerGroup"/>
+                    </m:oMathParaPr>
+                    <m:oMath xmlns:m="http://schemas.openxmlformats.org/officeDocument/2006/math">
+                      <m:r>
+                        <a:rPr lang="en-US" sz="1100" b="0" i="1" smtClean="0">
+                          <a:latin typeface="Cambria Math" panose="02040503050406030204" pitchFamily="18" charset="0"/>
+                        </a:rPr>
+                        <m:t>𝑦</m:t>
+                      </m:r>
+                    </m:oMath>
+                  </m:oMathPara>
+                </a14:m>
+                <a:endParaRPr lang="en-US" sz="1100" dirty="0"/>
+              </a:p>
+            </p:txBody>
+          </p:sp>
+        </mc:Choice>
+        <mc:Fallback xmlns="">
+          <p:sp>
+            <p:nvSpPr>
+              <p:cNvPr id="14" name="y"/>
+              <p:cNvSpPr txBox="1">
+                <a:spLocks noRot="1" noChangeAspect="1" noMove="1" noResize="1" noEditPoints="1" noAdjustHandles="1" noChangeArrowheads="1" noChangeShapeType="1" noTextEdit="1"/>
+              </p:cNvSpPr>
+              <p:nvPr/>
+            </p:nvSpPr>
+            <p:spPr>
+              <a:xfrm>
+                <a:off x="3436882" y="1223405"/>
+                <a:ext cx="369454" cy="261610"/>
+              </a:xfrm>
+              <a:prstGeom prst="rect">
+                <a:avLst/>
+              </a:prstGeom>
+              <a:blipFill>
+                <a:blip r:embed="rId3"/>
+                <a:stretch>
+                  <a:fillRect/>
+                </a:stretch>
+              </a:blipFill>
+            </p:spPr>
+            <p:txBody>
+              <a:bodyPr/>
+              <a:lstStyle/>
+              <a:p>
+                <a:r>
+                  <a:rPr lang="en-US">
+                    <a:noFill/>
+                  </a:rPr>
+                  <a:t> </a:t>
+                </a:r>
+              </a:p>
+            </p:txBody>
+          </p:sp>
+        </mc:Fallback>
+      </mc:AlternateContent>
+      <mc:AlternateContent xmlns:mc="http://schemas.openxmlformats.org/markup-compatibility/2006" xmlns:a14="http://schemas.microsoft.com/office/drawing/2010/main">
+        <mc:Choice Requires="a14">
+          <p:sp>
+            <p:nvSpPr>
+              <p:cNvPr id="15" name="TextBox theta"/>
+              <p:cNvSpPr txBox="1"/>
+              <p:nvPr/>
+            </p:nvSpPr>
+            <p:spPr>
+              <a:xfrm>
+                <a:off x="4125708" y="3056822"/>
+                <a:ext cx="369454" cy="276999"/>
+              </a:xfrm>
+              <a:prstGeom prst="rect">
+                <a:avLst/>
+              </a:prstGeom>
+              <a:noFill/>
+            </p:spPr>
+            <p:txBody>
+              <a:bodyPr wrap="square" rtlCol="0">
+                <a:spAutoFit/>
+              </a:bodyPr>
+              <a:lstStyle/>
+              <a:p>
+                <a:pPr/>
+                <a14:m>
+                  <m:oMathPara xmlns:m="http://schemas.openxmlformats.org/officeDocument/2006/math">
+                    <m:oMathParaPr>
+                      <m:jc m:val="centerGroup"/>
+                    </m:oMathParaPr>
+                    <m:oMath xmlns:m="http://schemas.openxmlformats.org/officeDocument/2006/math">
+                      <m:r>
+                        <a:rPr lang="en-US" sz="1200" b="0" i="1" smtClean="0">
+                          <a:solidFill>
+                            <a:schemeClr val="bg1">
+                              <a:lumMod val="75000"/>
+                            </a:schemeClr>
+                          </a:solidFill>
+                          <a:latin typeface="Cambria Math" panose="02040503050406030204" pitchFamily="18" charset="0"/>
+                        </a:rPr>
+                        <m:t>𝜃</m:t>
+                      </m:r>
+                    </m:oMath>
+                  </m:oMathPara>
+                </a14:m>
+                <a:endParaRPr lang="en-US" sz="1100" dirty="0">
+                  <a:solidFill>
+                    <a:schemeClr val="bg1">
+                      <a:lumMod val="75000"/>
+                    </a:schemeClr>
+                  </a:solidFill>
+                </a:endParaRPr>
+              </a:p>
+            </p:txBody>
+          </p:sp>
+        </mc:Choice>
+        <mc:Fallback xmlns="">
+          <p:sp>
+            <p:nvSpPr>
+              <p:cNvPr id="15" name="TextBox theta"/>
+              <p:cNvSpPr txBox="1">
+                <a:spLocks noRot="1" noChangeAspect="1" noMove="1" noResize="1" noEditPoints="1" noAdjustHandles="1" noChangeArrowheads="1" noChangeShapeType="1" noTextEdit="1"/>
+              </p:cNvSpPr>
+              <p:nvPr/>
+            </p:nvSpPr>
+            <p:spPr>
+              <a:xfrm>
+                <a:off x="4125708" y="3056822"/>
+                <a:ext cx="369454" cy="276999"/>
               </a:xfrm>
               <a:prstGeom prst="rect">
                 <a:avLst/>
@@ -3566,16 +5435,1547 @@
           </p:sp>
         </mc:Fallback>
       </mc:AlternateContent>
-      <p:sp>
-        <p:nvSpPr>
-          <p:cNvPr id="18" name="Rectangle 17"/>
+      <mc:AlternateContent xmlns:mc="http://schemas.openxmlformats.org/markup-compatibility/2006" xmlns:a14="http://schemas.microsoft.com/office/drawing/2010/main">
+        <mc:Choice Requires="a14">
+          <p:sp>
+            <p:nvSpPr>
+              <p:cNvPr id="16" name="TextBox theta"/>
+              <p:cNvSpPr txBox="1"/>
+              <p:nvPr/>
+            </p:nvSpPr>
+            <p:spPr>
+              <a:xfrm>
+                <a:off x="4129159" y="2802737"/>
+                <a:ext cx="369454" cy="276999"/>
+              </a:xfrm>
+              <a:prstGeom prst="rect">
+                <a:avLst/>
+              </a:prstGeom>
+              <a:noFill/>
+            </p:spPr>
+            <p:txBody>
+              <a:bodyPr wrap="square" rtlCol="0">
+                <a:spAutoFit/>
+              </a:bodyPr>
+              <a:lstStyle/>
+              <a:p>
+                <a:pPr/>
+                <a14:m>
+                  <m:oMathPara xmlns:m="http://schemas.openxmlformats.org/officeDocument/2006/math">
+                    <m:oMathParaPr>
+                      <m:jc m:val="centerGroup"/>
+                    </m:oMathParaPr>
+                    <m:oMath xmlns:m="http://schemas.openxmlformats.org/officeDocument/2006/math">
+                      <m:r>
+                        <a:rPr lang="en-US" sz="1200" b="0" i="1" smtClean="0">
+                          <a:solidFill>
+                            <a:schemeClr val="bg1">
+                              <a:lumMod val="75000"/>
+                            </a:schemeClr>
+                          </a:solidFill>
+                          <a:latin typeface="Cambria Math" panose="02040503050406030204" pitchFamily="18" charset="0"/>
+                        </a:rPr>
+                        <m:t>𝜃</m:t>
+                      </m:r>
+                    </m:oMath>
+                  </m:oMathPara>
+                </a14:m>
+                <a:endParaRPr lang="en-US" sz="1200" dirty="0">
+                  <a:solidFill>
+                    <a:schemeClr val="bg1">
+                      <a:lumMod val="75000"/>
+                    </a:schemeClr>
+                  </a:solidFill>
+                </a:endParaRPr>
+              </a:p>
+            </p:txBody>
+          </p:sp>
+        </mc:Choice>
+        <mc:Fallback xmlns="">
+          <p:sp>
+            <p:nvSpPr>
+              <p:cNvPr id="16" name="TextBox theta"/>
+              <p:cNvSpPr txBox="1">
+                <a:spLocks noRot="1" noChangeAspect="1" noMove="1" noResize="1" noEditPoints="1" noAdjustHandles="1" noChangeArrowheads="1" noChangeShapeType="1" noTextEdit="1"/>
+              </p:cNvSpPr>
+              <p:nvPr/>
+            </p:nvSpPr>
+            <p:spPr>
+              <a:xfrm>
+                <a:off x="4129159" y="2802737"/>
+                <a:ext cx="369454" cy="276999"/>
+              </a:xfrm>
+              <a:prstGeom prst="rect">
+                <a:avLst/>
+              </a:prstGeom>
+              <a:blipFill>
+                <a:blip r:embed="rId5"/>
+                <a:stretch>
+                  <a:fillRect/>
+                </a:stretch>
+              </a:blipFill>
+            </p:spPr>
+            <p:txBody>
+              <a:bodyPr/>
+              <a:lstStyle/>
+              <a:p>
+                <a:r>
+                  <a:rPr lang="en-US">
+                    <a:noFill/>
+                  </a:rPr>
+                  <a:t> </a:t>
+                </a:r>
+              </a:p>
+            </p:txBody>
+          </p:sp>
+        </mc:Fallback>
+      </mc:AlternateContent>
+      <p:sp>
+        <p:nvSpPr>
+          <p:cNvPr id="20" name="TextBox B"/>
+          <p:cNvSpPr txBox="1"/>
+          <p:nvPr/>
+        </p:nvSpPr>
+        <p:spPr>
+          <a:xfrm>
+            <a:off x="4526136" y="3366884"/>
+            <a:ext cx="373707" cy="338554"/>
+          </a:xfrm>
+          <a:prstGeom prst="rect">
+            <a:avLst/>
+          </a:prstGeom>
+          <a:noFill/>
+        </p:spPr>
+        <p:txBody>
+          <a:bodyPr wrap="square" rtlCol="0">
+            <a:spAutoFit/>
+          </a:bodyPr>
+          <a:lstStyle/>
+          <a:p>
+            <a:r>
+              <a:rPr lang="en-US" sz="1600" dirty="0">
+                <a:solidFill>
+                  <a:schemeClr val="bg1">
+                    <a:lumMod val="75000"/>
+                  </a:schemeClr>
+                </a:solidFill>
+              </a:rPr>
+              <a:t>B</a:t>
+            </a:r>
+          </a:p>
+        </p:txBody>
+      </p:sp>
+      <p:sp>
+        <p:nvSpPr>
+          <p:cNvPr id="21" name="TextBox C"/>
+          <p:cNvSpPr txBox="1"/>
+          <p:nvPr/>
+        </p:nvSpPr>
+        <p:spPr>
+          <a:xfrm>
+            <a:off x="4545447" y="2431662"/>
+            <a:ext cx="373707" cy="338554"/>
+          </a:xfrm>
+          <a:prstGeom prst="rect">
+            <a:avLst/>
+          </a:prstGeom>
+          <a:noFill/>
+        </p:spPr>
+        <p:txBody>
+          <a:bodyPr wrap="square" rtlCol="0">
+            <a:spAutoFit/>
+          </a:bodyPr>
+          <a:lstStyle/>
+          <a:p>
+            <a:r>
+              <a:rPr lang="en-US" sz="1600" dirty="0">
+                <a:solidFill>
+                  <a:schemeClr val="bg1">
+                    <a:lumMod val="75000"/>
+                  </a:schemeClr>
+                </a:solidFill>
+              </a:rPr>
+              <a:t>C</a:t>
+            </a:r>
+          </a:p>
+        </p:txBody>
+      </p:sp>
+      <p:sp>
+        <p:nvSpPr>
+          <p:cNvPr id="22" name="TextBox D"/>
+          <p:cNvSpPr txBox="1"/>
+          <p:nvPr/>
+        </p:nvSpPr>
+        <p:spPr>
+          <a:xfrm>
+            <a:off x="3619483" y="1865631"/>
+            <a:ext cx="373707" cy="338554"/>
+          </a:xfrm>
+          <a:prstGeom prst="rect">
+            <a:avLst/>
+          </a:prstGeom>
+          <a:noFill/>
+        </p:spPr>
+        <p:txBody>
+          <a:bodyPr wrap="square" rtlCol="0">
+            <a:spAutoFit/>
+          </a:bodyPr>
+          <a:lstStyle/>
+          <a:p>
+            <a:r>
+              <a:rPr lang="en-US" sz="1600" dirty="0">
+                <a:solidFill>
+                  <a:schemeClr val="bg1">
+                    <a:lumMod val="75000"/>
+                  </a:schemeClr>
+                </a:solidFill>
+              </a:rPr>
+              <a:t>D</a:t>
+            </a:r>
+          </a:p>
+        </p:txBody>
+      </p:sp>
+      <p:sp>
+        <p:nvSpPr>
+          <p:cNvPr id="17" name="TextBox A"/>
+          <p:cNvSpPr txBox="1"/>
+          <p:nvPr/>
+        </p:nvSpPr>
+        <p:spPr>
+          <a:xfrm>
+            <a:off x="3619484" y="3933592"/>
+            <a:ext cx="373707" cy="338554"/>
+          </a:xfrm>
+          <a:prstGeom prst="rect">
+            <a:avLst/>
+          </a:prstGeom>
+          <a:noFill/>
+        </p:spPr>
+        <p:txBody>
+          <a:bodyPr wrap="square" rtlCol="0">
+            <a:spAutoFit/>
+          </a:bodyPr>
+          <a:lstStyle/>
+          <a:p>
+            <a:r>
+              <a:rPr lang="en-US" sz="1600" dirty="0">
+                <a:solidFill>
+                  <a:schemeClr val="bg1">
+                    <a:lumMod val="75000"/>
+                  </a:schemeClr>
+                </a:solidFill>
+              </a:rPr>
+              <a:t>A</a:t>
+            </a:r>
+          </a:p>
+        </p:txBody>
+      </p:sp>
+      <p:grpSp>
+        <p:nvGrpSpPr>
+          <p:cNvPr id="53" name="Group 52">
+            <a:extLst>
+              <a:ext uri="{FF2B5EF4-FFF2-40B4-BE49-F238E27FC236}">
+                <a16:creationId xmlns:a16="http://schemas.microsoft.com/office/drawing/2014/main" id="{5C028CC2-3154-4D9B-97ED-C9EACBBDA64A}"/>
+              </a:ext>
+            </a:extLst>
+          </p:cNvPr>
+          <p:cNvGrpSpPr/>
+          <p:nvPr/>
+        </p:nvGrpSpPr>
+        <p:grpSpPr>
+          <a:xfrm>
+            <a:off x="3311209" y="2609018"/>
+            <a:ext cx="914400" cy="914400"/>
+            <a:chOff x="3375375" y="2669626"/>
+            <a:chExt cx="788805" cy="817752"/>
+          </a:xfrm>
+        </p:grpSpPr>
+        <p:sp>
+          <p:nvSpPr>
+            <p:cNvPr id="51" name="Arc 50">
+              <a:extLst>
+                <a:ext uri="{FF2B5EF4-FFF2-40B4-BE49-F238E27FC236}">
+                  <a16:creationId xmlns:a16="http://schemas.microsoft.com/office/drawing/2014/main" id="{C6D68AF9-6421-446E-9AC0-C5ED3A0D67CF}"/>
+                </a:ext>
+              </a:extLst>
+            </p:cNvPr>
+            <p:cNvSpPr/>
+            <p:nvPr/>
+          </p:nvSpPr>
+          <p:spPr>
+            <a:xfrm rot="5400000">
+              <a:off x="3366427" y="2682215"/>
+              <a:ext cx="810342" cy="785164"/>
+            </a:xfrm>
+            <a:prstGeom prst="arc">
+              <a:avLst>
+                <a:gd name="adj1" fmla="val 16223828"/>
+                <a:gd name="adj2" fmla="val 17906249"/>
+              </a:avLst>
+            </a:prstGeom>
+            <a:ln w="12700">
+              <a:solidFill>
+                <a:schemeClr val="bg1">
+                  <a:lumMod val="75000"/>
+                </a:schemeClr>
+              </a:solidFill>
+              <a:headEnd type="arrow" w="sm" len="sm"/>
+              <a:tailEnd type="arrow" w="sm" len="sm"/>
+            </a:ln>
+          </p:spPr>
+          <p:style>
+            <a:lnRef idx="1">
+              <a:schemeClr val="accent1"/>
+            </a:lnRef>
+            <a:fillRef idx="0">
+              <a:schemeClr val="accent1"/>
+            </a:fillRef>
+            <a:effectRef idx="0">
+              <a:schemeClr val="accent1"/>
+            </a:effectRef>
+            <a:fontRef idx="minor">
+              <a:schemeClr val="tx1"/>
+            </a:fontRef>
+          </p:style>
+          <p:txBody>
+            <a:bodyPr rtlCol="0" anchor="ctr"/>
+            <a:lstStyle/>
+            <a:p>
+              <a:pPr algn="ctr"/>
+              <a:endParaRPr lang="en-US"/>
+            </a:p>
+          </p:txBody>
+        </p:sp>
+        <p:sp>
+          <p:nvSpPr>
+            <p:cNvPr id="52" name="Arc 51">
+              <a:extLst>
+                <a:ext uri="{FF2B5EF4-FFF2-40B4-BE49-F238E27FC236}">
+                  <a16:creationId xmlns:a16="http://schemas.microsoft.com/office/drawing/2014/main" id="{DD71C409-55F1-4970-AAB8-754E73E008DE}"/>
+                </a:ext>
+              </a:extLst>
+            </p:cNvPr>
+            <p:cNvSpPr/>
+            <p:nvPr/>
+          </p:nvSpPr>
+          <p:spPr>
+            <a:xfrm rot="16200000" flipV="1">
+              <a:off x="3362786" y="2689625"/>
+              <a:ext cx="810342" cy="785164"/>
+            </a:xfrm>
+            <a:prstGeom prst="arc">
+              <a:avLst>
+                <a:gd name="adj1" fmla="val 16223828"/>
+                <a:gd name="adj2" fmla="val 17783741"/>
+              </a:avLst>
+            </a:prstGeom>
+            <a:ln w="12700">
+              <a:solidFill>
+                <a:schemeClr val="bg1">
+                  <a:lumMod val="75000"/>
+                </a:schemeClr>
+              </a:solidFill>
+              <a:headEnd type="arrow" w="sm" len="sm"/>
+              <a:tailEnd type="arrow" w="sm" len="sm"/>
+            </a:ln>
+          </p:spPr>
+          <p:style>
+            <a:lnRef idx="1">
+              <a:schemeClr val="accent1"/>
+            </a:lnRef>
+            <a:fillRef idx="0">
+              <a:schemeClr val="accent1"/>
+            </a:fillRef>
+            <a:effectRef idx="0">
+              <a:schemeClr val="accent1"/>
+            </a:effectRef>
+            <a:fontRef idx="minor">
+              <a:schemeClr val="tx1"/>
+            </a:fontRef>
+          </p:style>
+          <p:txBody>
+            <a:bodyPr rtlCol="0" anchor="ctr"/>
+            <a:lstStyle/>
+            <a:p>
+              <a:pPr algn="ctr"/>
+              <a:endParaRPr lang="en-US"/>
+            </a:p>
+          </p:txBody>
+        </p:sp>
+      </p:grpSp>
+      <p:cxnSp>
+        <p:nvCxnSpPr>
+          <p:cNvPr id="6" name="Straight Arrow Connector 5">
+            <a:extLst>
+              <a:ext uri="{FF2B5EF4-FFF2-40B4-BE49-F238E27FC236}">
+                <a16:creationId xmlns:a16="http://schemas.microsoft.com/office/drawing/2014/main" id="{E989F936-2CCE-4FB3-8701-D2B9C31EFF8B}"/>
+              </a:ext>
+            </a:extLst>
+          </p:cNvPr>
+          <p:cNvCxnSpPr>
+            <a:cxnSpLocks/>
+          </p:cNvCxnSpPr>
+          <p:nvPr/>
+        </p:nvCxnSpPr>
+        <p:spPr>
+          <a:xfrm flipV="1">
+            <a:off x="4693558" y="2439368"/>
+            <a:ext cx="548640" cy="1097280"/>
+          </a:xfrm>
+          <a:prstGeom prst="straightConnector1">
+            <a:avLst/>
+          </a:prstGeom>
+          <a:ln w="19050">
+            <a:solidFill>
+              <a:schemeClr val="tx1"/>
+            </a:solidFill>
+            <a:headEnd type="none" w="med" len="med"/>
+            <a:tailEnd type="arrow" w="med" len="med"/>
+          </a:ln>
+        </p:spPr>
+        <p:style>
+          <a:lnRef idx="1">
+            <a:schemeClr val="accent1"/>
+          </a:lnRef>
+          <a:fillRef idx="0">
+            <a:schemeClr val="accent1"/>
+          </a:fillRef>
+          <a:effectRef idx="0">
+            <a:schemeClr val="accent1"/>
+          </a:effectRef>
+          <a:fontRef idx="minor">
+            <a:schemeClr val="tx1"/>
+          </a:fontRef>
+        </p:style>
+      </p:cxnSp>
+      <p:cxnSp>
+        <p:nvCxnSpPr>
+          <p:cNvPr id="23" name="Straight Arrow Connector 22">
+            <a:extLst>
+              <a:ext uri="{FF2B5EF4-FFF2-40B4-BE49-F238E27FC236}">
+                <a16:creationId xmlns:a16="http://schemas.microsoft.com/office/drawing/2014/main" id="{1A373A94-8E05-457A-B763-09AAC34B6E79}"/>
+              </a:ext>
+            </a:extLst>
+          </p:cNvPr>
+          <p:cNvCxnSpPr>
+            <a:cxnSpLocks/>
+          </p:cNvCxnSpPr>
+          <p:nvPr/>
+        </p:nvCxnSpPr>
+        <p:spPr>
+          <a:xfrm flipH="1" flipV="1">
+            <a:off x="4142180" y="1505571"/>
+            <a:ext cx="548640" cy="1097280"/>
+          </a:xfrm>
+          <a:prstGeom prst="straightConnector1">
+            <a:avLst/>
+          </a:prstGeom>
+          <a:ln w="19050">
+            <a:solidFill>
+              <a:schemeClr val="tx1"/>
+            </a:solidFill>
+            <a:headEnd type="none" w="med" len="med"/>
+            <a:tailEnd type="arrow" w="med" len="med"/>
+          </a:ln>
+        </p:spPr>
+        <p:style>
+          <a:lnRef idx="1">
+            <a:schemeClr val="accent1"/>
+          </a:lnRef>
+          <a:fillRef idx="0">
+            <a:schemeClr val="accent1"/>
+          </a:fillRef>
+          <a:effectRef idx="0">
+            <a:schemeClr val="accent1"/>
+          </a:effectRef>
+          <a:fontRef idx="minor">
+            <a:schemeClr val="tx1"/>
+          </a:fontRef>
+        </p:style>
+      </p:cxnSp>
+      <p:sp>
+        <p:nvSpPr>
+          <p:cNvPr id="30" name="right angle">
+            <a:extLst>
+              <a:ext uri="{FF2B5EF4-FFF2-40B4-BE49-F238E27FC236}">
+                <a16:creationId xmlns:a16="http://schemas.microsoft.com/office/drawing/2014/main" id="{79B933BC-508A-41E2-AF94-B905A671ACF8}"/>
+              </a:ext>
+            </a:extLst>
+          </p:cNvPr>
           <p:cNvSpPr/>
           <p:nvPr/>
         </p:nvSpPr>
         <p:spPr>
+          <a:xfrm rot="14462811">
+            <a:off x="4525002" y="2497713"/>
+            <a:ext cx="137160" cy="137160"/>
+          </a:xfrm>
+          <a:custGeom>
+            <a:avLst/>
+            <a:gdLst>
+              <a:gd name="connsiteX0" fmla="*/ 0 w 830580"/>
+              <a:gd name="connsiteY0" fmla="*/ 0 h 701040"/>
+              <a:gd name="connsiteX1" fmla="*/ 830580 w 830580"/>
+              <a:gd name="connsiteY1" fmla="*/ 0 h 701040"/>
+              <a:gd name="connsiteX2" fmla="*/ 830580 w 830580"/>
+              <a:gd name="connsiteY2" fmla="*/ 701040 h 701040"/>
+            </a:gdLst>
+            <a:ahLst/>
+            <a:cxnLst>
+              <a:cxn ang="0">
+                <a:pos x="connsiteX0" y="connsiteY0"/>
+              </a:cxn>
+              <a:cxn ang="0">
+                <a:pos x="connsiteX1" y="connsiteY1"/>
+              </a:cxn>
+              <a:cxn ang="0">
+                <a:pos x="connsiteX2" y="connsiteY2"/>
+              </a:cxn>
+            </a:cxnLst>
+            <a:rect l="l" t="t" r="r" b="b"/>
+            <a:pathLst>
+              <a:path w="830580" h="701040">
+                <a:moveTo>
+                  <a:pt x="0" y="0"/>
+                </a:moveTo>
+                <a:lnTo>
+                  <a:pt x="830580" y="0"/>
+                </a:lnTo>
+                <a:lnTo>
+                  <a:pt x="830580" y="701040"/>
+                </a:lnTo>
+              </a:path>
+            </a:pathLst>
+          </a:custGeom>
+          <a:noFill/>
+          <a:ln w="19050">
+            <a:solidFill>
+              <a:schemeClr val="tx1"/>
+            </a:solidFill>
+          </a:ln>
+        </p:spPr>
+        <p:style>
+          <a:lnRef idx="2">
+            <a:schemeClr val="accent1">
+              <a:shade val="50000"/>
+            </a:schemeClr>
+          </a:lnRef>
+          <a:fillRef idx="1">
+            <a:schemeClr val="accent1"/>
+          </a:fillRef>
+          <a:effectRef idx="0">
+            <a:schemeClr val="accent1"/>
+          </a:effectRef>
+          <a:fontRef idx="minor">
+            <a:schemeClr val="lt1"/>
+          </a:fontRef>
+        </p:style>
+        <p:txBody>
+          <a:bodyPr rtlCol="0" anchor="ctr"/>
+          <a:lstStyle/>
+          <a:p>
+            <a:pPr algn="ctr"/>
+            <a:endParaRPr lang="en-US"/>
+          </a:p>
+        </p:txBody>
+      </p:sp>
+      <p:sp>
+        <p:nvSpPr>
+          <p:cNvPr id="31" name="right angle">
+            <a:extLst>
+              <a:ext uri="{FF2B5EF4-FFF2-40B4-BE49-F238E27FC236}">
+                <a16:creationId xmlns:a16="http://schemas.microsoft.com/office/drawing/2014/main" id="{2FFA0ADE-31D7-4F88-AA2C-28FB7BA33FD0}"/>
+              </a:ext>
+            </a:extLst>
+          </p:cNvPr>
+          <p:cNvSpPr/>
+          <p:nvPr/>
+        </p:nvSpPr>
+        <p:spPr>
+          <a:xfrm rot="18015991">
+            <a:off x="4584499" y="3372337"/>
+            <a:ext cx="137160" cy="137160"/>
+          </a:xfrm>
+          <a:custGeom>
+            <a:avLst/>
+            <a:gdLst>
+              <a:gd name="connsiteX0" fmla="*/ 0 w 830580"/>
+              <a:gd name="connsiteY0" fmla="*/ 0 h 701040"/>
+              <a:gd name="connsiteX1" fmla="*/ 830580 w 830580"/>
+              <a:gd name="connsiteY1" fmla="*/ 0 h 701040"/>
+              <a:gd name="connsiteX2" fmla="*/ 830580 w 830580"/>
+              <a:gd name="connsiteY2" fmla="*/ 701040 h 701040"/>
+            </a:gdLst>
+            <a:ahLst/>
+            <a:cxnLst>
+              <a:cxn ang="0">
+                <a:pos x="connsiteX0" y="connsiteY0"/>
+              </a:cxn>
+              <a:cxn ang="0">
+                <a:pos x="connsiteX1" y="connsiteY1"/>
+              </a:cxn>
+              <a:cxn ang="0">
+                <a:pos x="connsiteX2" y="connsiteY2"/>
+              </a:cxn>
+            </a:cxnLst>
+            <a:rect l="l" t="t" r="r" b="b"/>
+            <a:pathLst>
+              <a:path w="830580" h="701040">
+                <a:moveTo>
+                  <a:pt x="0" y="0"/>
+                </a:moveTo>
+                <a:lnTo>
+                  <a:pt x="830580" y="0"/>
+                </a:lnTo>
+                <a:lnTo>
+                  <a:pt x="830580" y="701040"/>
+                </a:lnTo>
+              </a:path>
+            </a:pathLst>
+          </a:custGeom>
+          <a:noFill/>
+          <a:ln w="19050">
+            <a:solidFill>
+              <a:schemeClr val="tx1"/>
+            </a:solidFill>
+          </a:ln>
+        </p:spPr>
+        <p:style>
+          <a:lnRef idx="2">
+            <a:schemeClr val="accent1">
+              <a:shade val="50000"/>
+            </a:schemeClr>
+          </a:lnRef>
+          <a:fillRef idx="1">
+            <a:schemeClr val="accent1"/>
+          </a:fillRef>
+          <a:effectRef idx="0">
+            <a:schemeClr val="accent1"/>
+          </a:effectRef>
+          <a:fontRef idx="minor">
+            <a:schemeClr val="lt1"/>
+          </a:fontRef>
+        </p:style>
+        <p:txBody>
+          <a:bodyPr rtlCol="0" anchor="ctr"/>
+          <a:lstStyle/>
+          <a:p>
+            <a:pPr algn="ctr"/>
+            <a:endParaRPr lang="en-US"/>
+          </a:p>
+        </p:txBody>
+      </p:sp>
+      <p:cxnSp>
+        <p:nvCxnSpPr>
+          <p:cNvPr id="32" name="Straight Connector 31">
+            <a:extLst>
+              <a:ext uri="{FF2B5EF4-FFF2-40B4-BE49-F238E27FC236}">
+                <a16:creationId xmlns:a16="http://schemas.microsoft.com/office/drawing/2014/main" id="{35D51ACC-A06B-4794-9680-401EFDE6BD4D}"/>
+              </a:ext>
+            </a:extLst>
+          </p:cNvPr>
+          <p:cNvCxnSpPr/>
+          <p:nvPr/>
+        </p:nvCxnSpPr>
+        <p:spPr>
           <a:xfrm>
-            <a:off x="3706368" y="4013885"/>
-            <a:ext cx="115824" cy="175656"/>
+            <a:off x="4689685" y="3534715"/>
+            <a:ext cx="849737" cy="0"/>
+          </a:xfrm>
+          <a:prstGeom prst="line">
+            <a:avLst/>
+          </a:prstGeom>
+          <a:ln w="12700">
+            <a:solidFill>
+              <a:schemeClr val="tx1"/>
+            </a:solidFill>
+            <a:prstDash val="dash"/>
+          </a:ln>
+        </p:spPr>
+        <p:style>
+          <a:lnRef idx="1">
+            <a:schemeClr val="accent1"/>
+          </a:lnRef>
+          <a:fillRef idx="0">
+            <a:schemeClr val="accent1"/>
+          </a:fillRef>
+          <a:effectRef idx="0">
+            <a:schemeClr val="accent1"/>
+          </a:effectRef>
+          <a:fontRef idx="minor">
+            <a:schemeClr val="tx1"/>
+          </a:fontRef>
+        </p:style>
+      </p:cxnSp>
+      <p:cxnSp>
+        <p:nvCxnSpPr>
+          <p:cNvPr id="33" name="Straight Connector 32">
+            <a:extLst>
+              <a:ext uri="{FF2B5EF4-FFF2-40B4-BE49-F238E27FC236}">
+                <a16:creationId xmlns:a16="http://schemas.microsoft.com/office/drawing/2014/main" id="{B11B36BB-10EA-4EFE-BF03-744242CD7B58}"/>
+              </a:ext>
+            </a:extLst>
+          </p:cNvPr>
+          <p:cNvCxnSpPr>
+            <a:cxnSpLocks/>
+          </p:cNvCxnSpPr>
+          <p:nvPr/>
+        </p:nvCxnSpPr>
+        <p:spPr>
+          <a:xfrm flipV="1">
+            <a:off x="4690760" y="1832610"/>
+            <a:ext cx="0" cy="1701485"/>
+          </a:xfrm>
+          <a:prstGeom prst="line">
+            <a:avLst/>
+          </a:prstGeom>
+          <a:ln w="12700">
+            <a:solidFill>
+              <a:schemeClr val="tx1"/>
+            </a:solidFill>
+            <a:prstDash val="dash"/>
+          </a:ln>
+        </p:spPr>
+        <p:style>
+          <a:lnRef idx="1">
+            <a:schemeClr val="accent1"/>
+          </a:lnRef>
+          <a:fillRef idx="0">
+            <a:schemeClr val="accent1"/>
+          </a:fillRef>
+          <a:effectRef idx="0">
+            <a:schemeClr val="accent1"/>
+          </a:effectRef>
+          <a:fontRef idx="minor">
+            <a:schemeClr val="tx1"/>
+          </a:fontRef>
+        </p:style>
+      </p:cxnSp>
+      <p:grpSp>
+        <p:nvGrpSpPr>
+          <p:cNvPr id="44" name="Group 43">
+            <a:extLst>
+              <a:ext uri="{FF2B5EF4-FFF2-40B4-BE49-F238E27FC236}">
+                <a16:creationId xmlns:a16="http://schemas.microsoft.com/office/drawing/2014/main" id="{1F951549-0813-4BF5-A40C-86A525E80718}"/>
+              </a:ext>
+            </a:extLst>
+          </p:cNvPr>
+          <p:cNvGrpSpPr/>
+          <p:nvPr/>
+        </p:nvGrpSpPr>
+        <p:grpSpPr>
+          <a:xfrm>
+            <a:off x="4235118" y="3075704"/>
+            <a:ext cx="914400" cy="914400"/>
+            <a:chOff x="4320085" y="3179728"/>
+            <a:chExt cx="745052" cy="768834"/>
+          </a:xfrm>
+        </p:grpSpPr>
+        <p:sp>
+          <p:nvSpPr>
+            <p:cNvPr id="35" name="Arc 34">
+              <a:extLst>
+                <a:ext uri="{FF2B5EF4-FFF2-40B4-BE49-F238E27FC236}">
+                  <a16:creationId xmlns:a16="http://schemas.microsoft.com/office/drawing/2014/main" id="{0D45DB91-B73A-499C-8AB8-B70BBD2E3A9A}"/>
+                </a:ext>
+              </a:extLst>
+            </p:cNvPr>
+            <p:cNvSpPr/>
+            <p:nvPr/>
+          </p:nvSpPr>
+          <p:spPr>
+            <a:xfrm>
+              <a:off x="4321887" y="3179728"/>
+              <a:ext cx="743250" cy="767084"/>
+            </a:xfrm>
+            <a:prstGeom prst="arc">
+              <a:avLst>
+                <a:gd name="adj1" fmla="val 17834694"/>
+                <a:gd name="adj2" fmla="val 0"/>
+              </a:avLst>
+            </a:prstGeom>
+            <a:ln w="12700">
+              <a:solidFill>
+                <a:schemeClr val="tx1"/>
+              </a:solidFill>
+              <a:headEnd type="arrow" w="sm" len="sm"/>
+              <a:tailEnd type="arrow" w="sm" len="sm"/>
+            </a:ln>
+          </p:spPr>
+          <p:style>
+            <a:lnRef idx="1">
+              <a:schemeClr val="accent1"/>
+            </a:lnRef>
+            <a:fillRef idx="0">
+              <a:schemeClr val="accent1"/>
+            </a:fillRef>
+            <a:effectRef idx="0">
+              <a:schemeClr val="accent1"/>
+            </a:effectRef>
+            <a:fontRef idx="minor">
+              <a:schemeClr val="tx1"/>
+            </a:fontRef>
+          </p:style>
+          <p:txBody>
+            <a:bodyPr rtlCol="0" anchor="ctr"/>
+            <a:lstStyle/>
+            <a:p>
+              <a:pPr algn="ctr"/>
+              <a:endParaRPr lang="en-US"/>
+            </a:p>
+          </p:txBody>
+        </p:sp>
+        <p:sp>
+          <p:nvSpPr>
+            <p:cNvPr id="36" name="Arc 35">
+              <a:extLst>
+                <a:ext uri="{FF2B5EF4-FFF2-40B4-BE49-F238E27FC236}">
+                  <a16:creationId xmlns:a16="http://schemas.microsoft.com/office/drawing/2014/main" id="{B3FAE778-66D2-46AF-937D-CE62E1E283EE}"/>
+                </a:ext>
+              </a:extLst>
+            </p:cNvPr>
+            <p:cNvSpPr/>
+            <p:nvPr/>
+          </p:nvSpPr>
+          <p:spPr>
+            <a:xfrm>
+              <a:off x="4320085" y="3181478"/>
+              <a:ext cx="743250" cy="767084"/>
+            </a:xfrm>
+            <a:prstGeom prst="arc">
+              <a:avLst>
+                <a:gd name="adj1" fmla="val 16223828"/>
+                <a:gd name="adj2" fmla="val 17835181"/>
+              </a:avLst>
+            </a:prstGeom>
+            <a:ln w="12700">
+              <a:solidFill>
+                <a:schemeClr val="tx1"/>
+              </a:solidFill>
+              <a:headEnd type="arrow" w="sm" len="sm"/>
+              <a:tailEnd type="arrow" w="sm" len="sm"/>
+            </a:ln>
+          </p:spPr>
+          <p:style>
+            <a:lnRef idx="1">
+              <a:schemeClr val="accent1"/>
+            </a:lnRef>
+            <a:fillRef idx="0">
+              <a:schemeClr val="accent1"/>
+            </a:fillRef>
+            <a:effectRef idx="0">
+              <a:schemeClr val="accent1"/>
+            </a:effectRef>
+            <a:fontRef idx="minor">
+              <a:schemeClr val="tx1"/>
+            </a:fontRef>
+          </p:style>
+          <p:txBody>
+            <a:bodyPr rtlCol="0" anchor="ctr"/>
+            <a:lstStyle/>
+            <a:p>
+              <a:pPr algn="ctr"/>
+              <a:endParaRPr lang="en-US"/>
+            </a:p>
+          </p:txBody>
+        </p:sp>
+      </p:grpSp>
+      <mc:AlternateContent xmlns:mc="http://schemas.openxmlformats.org/markup-compatibility/2006" xmlns:a14="http://schemas.microsoft.com/office/drawing/2010/main">
+        <mc:Choice Requires="a14">
+          <p:sp>
+            <p:nvSpPr>
+              <p:cNvPr id="37" name="TextBox theta">
+                <a:extLst>
+                  <a:ext uri="{FF2B5EF4-FFF2-40B4-BE49-F238E27FC236}">
+                    <a16:creationId xmlns:a16="http://schemas.microsoft.com/office/drawing/2014/main" id="{AEB6A9AA-10F4-4950-B248-0CB568C6F4A5}"/>
+                  </a:ext>
+                </a:extLst>
+              </p:cNvPr>
+              <p:cNvSpPr txBox="1"/>
+              <p:nvPr/>
+            </p:nvSpPr>
+            <p:spPr>
+              <a:xfrm>
+                <a:off x="4647905" y="2864628"/>
+                <a:ext cx="369454" cy="276999"/>
+              </a:xfrm>
+              <a:prstGeom prst="rect">
+                <a:avLst/>
+              </a:prstGeom>
+              <a:noFill/>
+            </p:spPr>
+            <p:txBody>
+              <a:bodyPr wrap="square" rtlCol="0">
+                <a:spAutoFit/>
+              </a:bodyPr>
+              <a:lstStyle/>
+              <a:p>
+                <a:pPr/>
+                <a14:m>
+                  <m:oMathPara xmlns:m="http://schemas.openxmlformats.org/officeDocument/2006/math">
+                    <m:oMathParaPr>
+                      <m:jc m:val="centerGroup"/>
+                    </m:oMathParaPr>
+                    <m:oMath xmlns:m="http://schemas.openxmlformats.org/officeDocument/2006/math">
+                      <m:r>
+                        <a:rPr lang="en-US" sz="1200" b="0" i="1" smtClean="0">
+                          <a:latin typeface="Cambria Math" panose="02040503050406030204" pitchFamily="18" charset="0"/>
+                        </a:rPr>
+                        <m:t>𝜃</m:t>
+                      </m:r>
+                    </m:oMath>
+                  </m:oMathPara>
+                </a14:m>
+                <a:endParaRPr lang="en-US" sz="1200" dirty="0"/>
+              </a:p>
+            </p:txBody>
+          </p:sp>
+        </mc:Choice>
+        <mc:Fallback xmlns="">
+          <p:sp>
+            <p:nvSpPr>
+              <p:cNvPr id="37" name="TextBox theta">
+                <a:extLst>
+                  <a:ext uri="{FF2B5EF4-FFF2-40B4-BE49-F238E27FC236}">
+                    <a16:creationId xmlns:a16="http://schemas.microsoft.com/office/drawing/2014/main" id="{AEB6A9AA-10F4-4950-B248-0CB568C6F4A5}"/>
+                  </a:ext>
+                </a:extLst>
+              </p:cNvPr>
+              <p:cNvSpPr txBox="1">
+                <a:spLocks noRot="1" noChangeAspect="1" noMove="1" noResize="1" noEditPoints="1" noAdjustHandles="1" noChangeArrowheads="1" noChangeShapeType="1" noTextEdit="1"/>
+              </p:cNvSpPr>
+              <p:nvPr/>
+            </p:nvSpPr>
+            <p:spPr>
+              <a:xfrm>
+                <a:off x="4647905" y="2864628"/>
+                <a:ext cx="369454" cy="276999"/>
+              </a:xfrm>
+              <a:prstGeom prst="rect">
+                <a:avLst/>
+              </a:prstGeom>
+              <a:blipFill>
+                <a:blip r:embed="rId6"/>
+                <a:stretch>
+                  <a:fillRect/>
+                </a:stretch>
+              </a:blipFill>
+            </p:spPr>
+            <p:txBody>
+              <a:bodyPr/>
+              <a:lstStyle/>
+              <a:p>
+                <a:r>
+                  <a:rPr lang="en-US">
+                    <a:noFill/>
+                  </a:rPr>
+                  <a:t> </a:t>
+                </a:r>
+              </a:p>
+            </p:txBody>
+          </p:sp>
+        </mc:Fallback>
+      </mc:AlternateContent>
+      <mc:AlternateContent xmlns:mc="http://schemas.openxmlformats.org/markup-compatibility/2006" xmlns:a14="http://schemas.microsoft.com/office/drawing/2010/main">
+        <mc:Choice Requires="a14">
+          <p:sp>
+            <p:nvSpPr>
+              <p:cNvPr id="38" name="TextBox 90 - theta">
+                <a:extLst>
+                  <a:ext uri="{FF2B5EF4-FFF2-40B4-BE49-F238E27FC236}">
+                    <a16:creationId xmlns:a16="http://schemas.microsoft.com/office/drawing/2014/main" id="{3F736BEB-6FB0-46E0-B4F3-8E3EEC31FD98}"/>
+                  </a:ext>
+                </a:extLst>
+              </p:cNvPr>
+              <p:cNvSpPr txBox="1"/>
+              <p:nvPr/>
+            </p:nvSpPr>
+            <p:spPr>
+              <a:xfrm>
+                <a:off x="5029157" y="3184843"/>
+                <a:ext cx="747220" cy="276999"/>
+              </a:xfrm>
+              <a:prstGeom prst="rect">
+                <a:avLst/>
+              </a:prstGeom>
+              <a:noFill/>
+            </p:spPr>
+            <p:txBody>
+              <a:bodyPr wrap="square" rtlCol="0">
+                <a:spAutoFit/>
+              </a:bodyPr>
+              <a:lstStyle/>
+              <a:p>
+                <a:pPr/>
+                <a14:m>
+                  <m:oMathPara xmlns:m="http://schemas.openxmlformats.org/officeDocument/2006/math">
+                    <m:oMathParaPr>
+                      <m:jc m:val="centerGroup"/>
+                    </m:oMathParaPr>
+                    <m:oMath xmlns:m="http://schemas.openxmlformats.org/officeDocument/2006/math">
+                      <m:r>
+                        <a:rPr lang="en-US" sz="1200" b="0" i="1" smtClean="0">
+                          <a:latin typeface="Cambria Math" panose="02040503050406030204" pitchFamily="18" charset="0"/>
+                        </a:rPr>
+                        <m:t>90</m:t>
+                      </m:r>
+                      <m:r>
+                        <a:rPr lang="en-US" sz="1200" b="0" i="1" smtClean="0">
+                          <a:latin typeface="Cambria Math" panose="02040503050406030204" pitchFamily="18" charset="0"/>
+                          <a:ea typeface="Cambria Math" panose="02040503050406030204" pitchFamily="18" charset="0"/>
+                        </a:rPr>
+                        <m:t>°−</m:t>
+                      </m:r>
+                      <m:r>
+                        <a:rPr lang="en-US" sz="1200" b="0" i="1" smtClean="0">
+                          <a:latin typeface="Cambria Math" panose="02040503050406030204" pitchFamily="18" charset="0"/>
+                        </a:rPr>
+                        <m:t>𝜃</m:t>
+                      </m:r>
+                    </m:oMath>
+                  </m:oMathPara>
+                </a14:m>
+                <a:endParaRPr lang="en-US" sz="1200" dirty="0"/>
+              </a:p>
+            </p:txBody>
+          </p:sp>
+        </mc:Choice>
+        <mc:Fallback xmlns="">
+          <p:sp>
+            <p:nvSpPr>
+              <p:cNvPr id="38" name="TextBox 90 - theta">
+                <a:extLst>
+                  <a:ext uri="{FF2B5EF4-FFF2-40B4-BE49-F238E27FC236}">
+                    <a16:creationId xmlns:a16="http://schemas.microsoft.com/office/drawing/2014/main" id="{3F736BEB-6FB0-46E0-B4F3-8E3EEC31FD98}"/>
+                  </a:ext>
+                </a:extLst>
+              </p:cNvPr>
+              <p:cNvSpPr txBox="1">
+                <a:spLocks noRot="1" noChangeAspect="1" noMove="1" noResize="1" noEditPoints="1" noAdjustHandles="1" noChangeArrowheads="1" noChangeShapeType="1" noTextEdit="1"/>
+              </p:cNvSpPr>
+              <p:nvPr/>
+            </p:nvSpPr>
+            <p:spPr>
+              <a:xfrm>
+                <a:off x="5029157" y="3184843"/>
+                <a:ext cx="747220" cy="276999"/>
+              </a:xfrm>
+              <a:prstGeom prst="rect">
+                <a:avLst/>
+              </a:prstGeom>
+              <a:blipFill>
+                <a:blip r:embed="rId7"/>
+                <a:stretch>
+                  <a:fillRect/>
+                </a:stretch>
+              </a:blipFill>
+            </p:spPr>
+            <p:txBody>
+              <a:bodyPr/>
+              <a:lstStyle/>
+              <a:p>
+                <a:r>
+                  <a:rPr lang="en-US">
+                    <a:noFill/>
+                  </a:rPr>
+                  <a:t> </a:t>
+                </a:r>
+              </a:p>
+            </p:txBody>
+          </p:sp>
+        </mc:Fallback>
+      </mc:AlternateContent>
+      <mc:AlternateContent xmlns:mc="http://schemas.openxmlformats.org/markup-compatibility/2006" xmlns:a14="http://schemas.microsoft.com/office/drawing/2010/main">
+        <mc:Choice Requires="a14">
+          <p:sp>
+            <p:nvSpPr>
+              <p:cNvPr id="39" name="textbox v_c">
+                <a:extLst>
+                  <a:ext uri="{FF2B5EF4-FFF2-40B4-BE49-F238E27FC236}">
+                    <a16:creationId xmlns:a16="http://schemas.microsoft.com/office/drawing/2014/main" id="{3B6472A9-FB04-4C20-BE87-2CBAE883A22B}"/>
+                  </a:ext>
+                </a:extLst>
+              </p:cNvPr>
+              <p:cNvSpPr txBox="1"/>
+              <p:nvPr/>
+            </p:nvSpPr>
+            <p:spPr>
+              <a:xfrm>
+                <a:off x="4111218" y="1354210"/>
+                <a:ext cx="369454" cy="261610"/>
+              </a:xfrm>
+              <a:prstGeom prst="rect">
+                <a:avLst/>
+              </a:prstGeom>
+              <a:noFill/>
+            </p:spPr>
+            <p:txBody>
+              <a:bodyPr wrap="square" rtlCol="0">
+                <a:spAutoFit/>
+              </a:bodyPr>
+              <a:lstStyle/>
+              <a:p>
+                <a:pPr/>
+                <a14:m>
+                  <m:oMathPara xmlns:m="http://schemas.openxmlformats.org/officeDocument/2006/math">
+                    <m:oMathParaPr>
+                      <m:jc m:val="centerGroup"/>
+                    </m:oMathParaPr>
+                    <m:oMath xmlns:m="http://schemas.openxmlformats.org/officeDocument/2006/math">
+                      <m:sSub>
+                        <m:sSubPr>
+                          <m:ctrlPr>
+                            <a:rPr lang="en-US" sz="1100" b="0" i="1" smtClean="0">
+                              <a:latin typeface="Cambria Math" panose="02040503050406030204" pitchFamily="18" charset="0"/>
+                            </a:rPr>
+                          </m:ctrlPr>
+                        </m:sSubPr>
+                        <m:e>
+                          <m:acc>
+                            <m:accPr>
+                              <m:chr m:val="⃗"/>
+                              <m:ctrlPr>
+                                <a:rPr lang="en-US" sz="1100" i="1" smtClean="0">
+                                  <a:latin typeface="Cambria Math" panose="02040503050406030204" pitchFamily="18" charset="0"/>
+                                </a:rPr>
+                              </m:ctrlPr>
+                            </m:accPr>
+                            <m:e>
+                              <m:r>
+                                <a:rPr lang="en-US" sz="1100" b="0" i="1" smtClean="0">
+                                  <a:latin typeface="Cambria Math" panose="02040503050406030204" pitchFamily="18" charset="0"/>
+                                </a:rPr>
+                                <m:t>𝑣</m:t>
+                              </m:r>
+                            </m:e>
+                          </m:acc>
+                        </m:e>
+                        <m:sub>
+                          <m:r>
+                            <a:rPr lang="en-US" sz="1100" b="0" i="1" smtClean="0">
+                              <a:latin typeface="Cambria Math" panose="02040503050406030204" pitchFamily="18" charset="0"/>
+                            </a:rPr>
+                            <m:t>𝐶</m:t>
+                          </m:r>
+                        </m:sub>
+                      </m:sSub>
+                    </m:oMath>
+                  </m:oMathPara>
+                </a14:m>
+                <a:endParaRPr lang="en-US" sz="1100" dirty="0"/>
+              </a:p>
+            </p:txBody>
+          </p:sp>
+        </mc:Choice>
+        <mc:Fallback xmlns="">
+          <p:sp>
+            <p:nvSpPr>
+              <p:cNvPr id="39" name="textbox v_c">
+                <a:extLst>
+                  <a:ext uri="{FF2B5EF4-FFF2-40B4-BE49-F238E27FC236}">
+                    <a16:creationId xmlns:a16="http://schemas.microsoft.com/office/drawing/2014/main" id="{3B6472A9-FB04-4C20-BE87-2CBAE883A22B}"/>
+                  </a:ext>
+                </a:extLst>
+              </p:cNvPr>
+              <p:cNvSpPr txBox="1">
+                <a:spLocks noRot="1" noChangeAspect="1" noMove="1" noResize="1" noEditPoints="1" noAdjustHandles="1" noChangeArrowheads="1" noChangeShapeType="1" noTextEdit="1"/>
+              </p:cNvSpPr>
+              <p:nvPr/>
+            </p:nvSpPr>
+            <p:spPr>
+              <a:xfrm>
+                <a:off x="4111218" y="1354210"/>
+                <a:ext cx="369454" cy="261610"/>
+              </a:xfrm>
+              <a:prstGeom prst="rect">
+                <a:avLst/>
+              </a:prstGeom>
+              <a:blipFill>
+                <a:blip r:embed="rId8"/>
+                <a:stretch>
+                  <a:fillRect t="-2326" r="-3279"/>
+                </a:stretch>
+              </a:blipFill>
+            </p:spPr>
+            <p:txBody>
+              <a:bodyPr/>
+              <a:lstStyle/>
+              <a:p>
+                <a:r>
+                  <a:rPr lang="en-US">
+                    <a:noFill/>
+                  </a:rPr>
+                  <a:t> </a:t>
+                </a:r>
+              </a:p>
+            </p:txBody>
+          </p:sp>
+        </mc:Fallback>
+      </mc:AlternateContent>
+      <mc:AlternateContent xmlns:mc="http://schemas.openxmlformats.org/markup-compatibility/2006" xmlns:a14="http://schemas.microsoft.com/office/drawing/2010/main">
+        <mc:Choice Requires="a14">
+          <p:sp>
+            <p:nvSpPr>
+              <p:cNvPr id="40" name="textbox v_b">
+                <a:extLst>
+                  <a:ext uri="{FF2B5EF4-FFF2-40B4-BE49-F238E27FC236}">
+                    <a16:creationId xmlns:a16="http://schemas.microsoft.com/office/drawing/2014/main" id="{8B316C6F-D447-4C2C-9F72-5938BCD41CFB}"/>
+                  </a:ext>
+                </a:extLst>
+              </p:cNvPr>
+              <p:cNvSpPr txBox="1"/>
+              <p:nvPr/>
+            </p:nvSpPr>
+            <p:spPr>
+              <a:xfrm>
+                <a:off x="5181375" y="2364168"/>
+                <a:ext cx="369454" cy="261610"/>
+              </a:xfrm>
+              <a:prstGeom prst="rect">
+                <a:avLst/>
+              </a:prstGeom>
+              <a:noFill/>
+            </p:spPr>
+            <p:txBody>
+              <a:bodyPr wrap="square" rtlCol="0">
+                <a:spAutoFit/>
+              </a:bodyPr>
+              <a:lstStyle/>
+              <a:p>
+                <a:pPr/>
+                <a14:m>
+                  <m:oMathPara xmlns:m="http://schemas.openxmlformats.org/officeDocument/2006/math">
+                    <m:oMathParaPr>
+                      <m:jc m:val="centerGroup"/>
+                    </m:oMathParaPr>
+                    <m:oMath xmlns:m="http://schemas.openxmlformats.org/officeDocument/2006/math">
+                      <m:sSub>
+                        <m:sSubPr>
+                          <m:ctrlPr>
+                            <a:rPr lang="en-US" sz="1100" b="0" i="1" smtClean="0">
+                              <a:latin typeface="Cambria Math" panose="02040503050406030204" pitchFamily="18" charset="0"/>
+                            </a:rPr>
+                          </m:ctrlPr>
+                        </m:sSubPr>
+                        <m:e>
+                          <m:acc>
+                            <m:accPr>
+                              <m:chr m:val="⃗"/>
+                              <m:ctrlPr>
+                                <a:rPr lang="en-US" sz="1100" i="1" smtClean="0">
+                                  <a:latin typeface="Cambria Math" panose="02040503050406030204" pitchFamily="18" charset="0"/>
+                                </a:rPr>
+                              </m:ctrlPr>
+                            </m:accPr>
+                            <m:e>
+                              <m:r>
+                                <a:rPr lang="en-US" sz="1100" b="0" i="1" smtClean="0">
+                                  <a:latin typeface="Cambria Math" panose="02040503050406030204" pitchFamily="18" charset="0"/>
+                                </a:rPr>
+                                <m:t>𝑣</m:t>
+                              </m:r>
+                            </m:e>
+                          </m:acc>
+                        </m:e>
+                        <m:sub>
+                          <m:r>
+                            <a:rPr lang="en-US" sz="1100" b="0" i="1" smtClean="0">
+                              <a:latin typeface="Cambria Math" panose="02040503050406030204" pitchFamily="18" charset="0"/>
+                            </a:rPr>
+                            <m:t>𝐵</m:t>
+                          </m:r>
+                        </m:sub>
+                      </m:sSub>
+                    </m:oMath>
+                  </m:oMathPara>
+                </a14:m>
+                <a:endParaRPr lang="en-US" sz="1100" dirty="0"/>
+              </a:p>
+            </p:txBody>
+          </p:sp>
+        </mc:Choice>
+        <mc:Fallback xmlns="">
+          <p:sp>
+            <p:nvSpPr>
+              <p:cNvPr id="40" name="textbox v_b">
+                <a:extLst>
+                  <a:ext uri="{FF2B5EF4-FFF2-40B4-BE49-F238E27FC236}">
+                    <a16:creationId xmlns:a16="http://schemas.microsoft.com/office/drawing/2014/main" id="{8B316C6F-D447-4C2C-9F72-5938BCD41CFB}"/>
+                  </a:ext>
+                </a:extLst>
+              </p:cNvPr>
+              <p:cNvSpPr txBox="1">
+                <a:spLocks noRot="1" noChangeAspect="1" noMove="1" noResize="1" noEditPoints="1" noAdjustHandles="1" noChangeArrowheads="1" noChangeShapeType="1" noTextEdit="1"/>
+              </p:cNvSpPr>
+              <p:nvPr/>
+            </p:nvSpPr>
+            <p:spPr>
+              <a:xfrm>
+                <a:off x="5181375" y="2364168"/>
+                <a:ext cx="369454" cy="261610"/>
+              </a:xfrm>
+              <a:prstGeom prst="rect">
+                <a:avLst/>
+              </a:prstGeom>
+              <a:blipFill>
+                <a:blip r:embed="rId9"/>
+                <a:stretch>
+                  <a:fillRect t="-2326" r="-1639"/>
+                </a:stretch>
+              </a:blipFill>
+            </p:spPr>
+            <p:txBody>
+              <a:bodyPr/>
+              <a:lstStyle/>
+              <a:p>
+                <a:r>
+                  <a:rPr lang="en-US">
+                    <a:noFill/>
+                  </a:rPr>
+                  <a:t> </a:t>
+                </a:r>
+              </a:p>
+            </p:txBody>
+          </p:sp>
+        </mc:Fallback>
+      </mc:AlternateContent>
+      <p:sp>
+        <p:nvSpPr>
+          <p:cNvPr id="47" name="Arc 46">
+            <a:extLst>
+              <a:ext uri="{FF2B5EF4-FFF2-40B4-BE49-F238E27FC236}">
+                <a16:creationId xmlns:a16="http://schemas.microsoft.com/office/drawing/2014/main" id="{FD9D2BE2-0287-41C5-8A61-B2A95FD0E48A}"/>
+              </a:ext>
+            </a:extLst>
+          </p:cNvPr>
+          <p:cNvSpPr/>
+          <p:nvPr/>
+        </p:nvSpPr>
+        <p:spPr>
+          <a:xfrm flipH="1">
+            <a:off x="4235169" y="2077143"/>
+            <a:ext cx="914400" cy="914400"/>
+          </a:xfrm>
+          <a:prstGeom prst="arc">
+            <a:avLst>
+              <a:gd name="adj1" fmla="val 16223828"/>
+              <a:gd name="adj2" fmla="val 18076305"/>
+            </a:avLst>
+          </a:prstGeom>
+          <a:ln w="12700">
+            <a:solidFill>
+              <a:schemeClr val="tx1"/>
+            </a:solidFill>
+            <a:headEnd type="arrow" w="sm" len="sm"/>
+            <a:tailEnd type="arrow" w="sm" len="sm"/>
+          </a:ln>
+        </p:spPr>
+        <p:style>
+          <a:lnRef idx="1">
+            <a:schemeClr val="accent1"/>
+          </a:lnRef>
+          <a:fillRef idx="0">
+            <a:schemeClr val="accent1"/>
+          </a:fillRef>
+          <a:effectRef idx="0">
+            <a:schemeClr val="accent1"/>
+          </a:effectRef>
+          <a:fontRef idx="minor">
+            <a:schemeClr val="tx1"/>
+          </a:fontRef>
+        </p:style>
+        <p:txBody>
+          <a:bodyPr rtlCol="0" anchor="ctr"/>
+          <a:lstStyle/>
+          <a:p>
+            <a:pPr algn="ctr"/>
+            <a:endParaRPr lang="en-US"/>
+          </a:p>
+        </p:txBody>
+      </p:sp>
+      <mc:AlternateContent xmlns:mc="http://schemas.openxmlformats.org/markup-compatibility/2006" xmlns:a14="http://schemas.microsoft.com/office/drawing/2010/main">
+        <mc:Choice Requires="a14">
+          <p:sp>
+            <p:nvSpPr>
+              <p:cNvPr id="48" name="TextBox theta">
+                <a:extLst>
+                  <a:ext uri="{FF2B5EF4-FFF2-40B4-BE49-F238E27FC236}">
+                    <a16:creationId xmlns:a16="http://schemas.microsoft.com/office/drawing/2014/main" id="{2F1806AA-D03B-4887-98DC-B0BE5F046686}"/>
+                  </a:ext>
+                </a:extLst>
+              </p:cNvPr>
+              <p:cNvSpPr txBox="1"/>
+              <p:nvPr/>
+            </p:nvSpPr>
+            <p:spPr>
+              <a:xfrm>
+                <a:off x="4372088" y="1870785"/>
+                <a:ext cx="369454" cy="276999"/>
+              </a:xfrm>
+              <a:prstGeom prst="rect">
+                <a:avLst/>
+              </a:prstGeom>
+              <a:noFill/>
+            </p:spPr>
+            <p:txBody>
+              <a:bodyPr wrap="square" rtlCol="0">
+                <a:spAutoFit/>
+              </a:bodyPr>
+              <a:lstStyle/>
+              <a:p>
+                <a:pPr/>
+                <a14:m>
+                  <m:oMathPara xmlns:m="http://schemas.openxmlformats.org/officeDocument/2006/math">
+                    <m:oMathParaPr>
+                      <m:jc m:val="centerGroup"/>
+                    </m:oMathParaPr>
+                    <m:oMath xmlns:m="http://schemas.openxmlformats.org/officeDocument/2006/math">
+                      <m:r>
+                        <a:rPr lang="en-US" sz="1200" b="0" i="1" smtClean="0">
+                          <a:latin typeface="Cambria Math" panose="02040503050406030204" pitchFamily="18" charset="0"/>
+                        </a:rPr>
+                        <m:t>𝜃</m:t>
+                      </m:r>
+                    </m:oMath>
+                  </m:oMathPara>
+                </a14:m>
+                <a:endParaRPr lang="en-US" sz="1200" dirty="0"/>
+              </a:p>
+            </p:txBody>
+          </p:sp>
+        </mc:Choice>
+        <mc:Fallback xmlns="">
+          <p:sp>
+            <p:nvSpPr>
+              <p:cNvPr id="48" name="TextBox theta">
+                <a:extLst>
+                  <a:ext uri="{FF2B5EF4-FFF2-40B4-BE49-F238E27FC236}">
+                    <a16:creationId xmlns:a16="http://schemas.microsoft.com/office/drawing/2014/main" id="{2F1806AA-D03B-4887-98DC-B0BE5F046686}"/>
+                  </a:ext>
+                </a:extLst>
+              </p:cNvPr>
+              <p:cNvSpPr txBox="1">
+                <a:spLocks noRot="1" noChangeAspect="1" noMove="1" noResize="1" noEditPoints="1" noAdjustHandles="1" noChangeArrowheads="1" noChangeShapeType="1" noTextEdit="1"/>
+              </p:cNvSpPr>
+              <p:nvPr/>
+            </p:nvSpPr>
+            <p:spPr>
+              <a:xfrm>
+                <a:off x="4372088" y="1870785"/>
+                <a:ext cx="369454" cy="276999"/>
+              </a:xfrm>
+              <a:prstGeom prst="rect">
+                <a:avLst/>
+              </a:prstGeom>
+              <a:blipFill>
+                <a:blip r:embed="rId6"/>
+                <a:stretch>
+                  <a:fillRect/>
+                </a:stretch>
+              </a:blipFill>
+            </p:spPr>
+            <p:txBody>
+              <a:bodyPr/>
+              <a:lstStyle/>
+              <a:p>
+                <a:r>
+                  <a:rPr lang="en-US">
+                    <a:noFill/>
+                  </a:rPr>
+                  <a:t> </a:t>
+                </a:r>
+              </a:p>
+            </p:txBody>
+          </p:sp>
+        </mc:Fallback>
+      </mc:AlternateContent>
+      <p:sp>
+        <p:nvSpPr>
+          <p:cNvPr id="2" name="Rectangle 1">
+            <a:extLst>
+              <a:ext uri="{FF2B5EF4-FFF2-40B4-BE49-F238E27FC236}">
+                <a16:creationId xmlns:a16="http://schemas.microsoft.com/office/drawing/2014/main" id="{3C235889-D368-4CDC-AF82-B1CA9CD000D5}"/>
+              </a:ext>
+            </a:extLst>
+          </p:cNvPr>
+          <p:cNvSpPr/>
+          <p:nvPr/>
+        </p:nvSpPr>
+        <p:spPr>
+          <a:xfrm>
+            <a:off x="2517601" y="1485015"/>
+            <a:ext cx="1144386" cy="3139739"/>
+          </a:xfrm>
+          <a:prstGeom prst="rect">
+            <a:avLst/>
+          </a:prstGeom>
+          <a:gradFill>
+            <a:gsLst>
+              <a:gs pos="0">
+                <a:schemeClr val="bg1"/>
+              </a:gs>
+              <a:gs pos="84000">
+                <a:srgbClr val="FFFFFF">
+                  <a:alpha val="70000"/>
+                </a:srgbClr>
+              </a:gs>
+              <a:gs pos="66000">
+                <a:schemeClr val="bg1"/>
+              </a:gs>
+              <a:gs pos="100000">
+                <a:schemeClr val="bg1">
+                  <a:alpha val="0"/>
+                </a:schemeClr>
+              </a:gs>
+            </a:gsLst>
+            <a:lin ang="0" scaled="0"/>
+          </a:gradFill>
+          <a:ln>
+            <a:noFill/>
+          </a:ln>
+          <a:effectLst/>
+        </p:spPr>
+        <p:style>
+          <a:lnRef idx="2">
+            <a:schemeClr val="accent1">
+              <a:shade val="50000"/>
+            </a:schemeClr>
+          </a:lnRef>
+          <a:fillRef idx="1">
+            <a:schemeClr val="accent1"/>
+          </a:fillRef>
+          <a:effectRef idx="0">
+            <a:schemeClr val="accent1"/>
+          </a:effectRef>
+          <a:fontRef idx="minor">
+            <a:schemeClr val="lt1"/>
+          </a:fontRef>
+        </p:style>
+        <p:txBody>
+          <a:bodyPr rtlCol="0" anchor="ctr"/>
+          <a:lstStyle/>
+          <a:p>
+            <a:pPr algn="ctr"/>
+            <a:endParaRPr lang="en-US"/>
+          </a:p>
+        </p:txBody>
+      </p:sp>
+      <p:sp>
+        <p:nvSpPr>
+          <p:cNvPr id="3" name="Rectangle 2">
+            <a:extLst>
+              <a:ext uri="{FF2B5EF4-FFF2-40B4-BE49-F238E27FC236}">
+                <a16:creationId xmlns:a16="http://schemas.microsoft.com/office/drawing/2014/main" id="{77E9FC83-39F2-4BF8-A26F-17593418FF85}"/>
+              </a:ext>
+            </a:extLst>
+          </p:cNvPr>
+          <p:cNvSpPr/>
+          <p:nvPr/>
+        </p:nvSpPr>
+        <p:spPr>
+          <a:xfrm>
+            <a:off x="1761744" y="2802737"/>
+            <a:ext cx="910180" cy="564147"/>
           </a:xfrm>
           <a:prstGeom prst="rect">
             <a:avLst/>
@@ -3612,184 +7012,10 @@
           </a:p>
         </p:txBody>
       </p:sp>
-      <p:sp>
-        <p:nvSpPr>
-          <p:cNvPr id="19" name="Rectangle 18"/>
-          <p:cNvSpPr/>
-          <p:nvPr/>
-        </p:nvSpPr>
-        <p:spPr>
-          <a:xfrm>
-            <a:off x="3712176" y="1953333"/>
-            <a:ext cx="115824" cy="175656"/>
-          </a:xfrm>
-          <a:prstGeom prst="rect">
-            <a:avLst/>
-          </a:prstGeom>
-          <a:solidFill>
-            <a:schemeClr val="bg1"/>
-          </a:solidFill>
-          <a:ln>
-            <a:noFill/>
-          </a:ln>
-        </p:spPr>
-        <p:style>
-          <a:lnRef idx="2">
-            <a:schemeClr val="accent1">
-              <a:shade val="50000"/>
-            </a:schemeClr>
-          </a:lnRef>
-          <a:fillRef idx="1">
-            <a:schemeClr val="accent1"/>
-          </a:fillRef>
-          <a:effectRef idx="0">
-            <a:schemeClr val="accent1"/>
-          </a:effectRef>
-          <a:fontRef idx="minor">
-            <a:schemeClr val="lt1"/>
-          </a:fontRef>
-        </p:style>
-        <p:txBody>
-          <a:bodyPr rtlCol="0" anchor="ctr"/>
-          <a:lstStyle/>
-          <a:p>
-            <a:pPr algn="ctr"/>
-            <a:endParaRPr lang="en-US"/>
-          </a:p>
-        </p:txBody>
-      </p:sp>
-      <p:sp>
-        <p:nvSpPr>
-          <p:cNvPr id="20" name="TextBox 19"/>
-          <p:cNvSpPr txBox="1"/>
-          <p:nvPr/>
-        </p:nvSpPr>
-        <p:spPr>
-          <a:xfrm>
-            <a:off x="4526136" y="3408794"/>
-            <a:ext cx="373707" cy="584775"/>
-          </a:xfrm>
-          <a:prstGeom prst="rect">
-            <a:avLst/>
-          </a:prstGeom>
-          <a:noFill/>
-        </p:spPr>
-        <p:txBody>
-          <a:bodyPr wrap="square" rtlCol="0">
-            <a:spAutoFit/>
-          </a:bodyPr>
-          <a:lstStyle/>
-          <a:p>
-            <a:r>
-              <a:rPr lang="en-US" sz="1600" dirty="0" smtClean="0"/>
-              <a:t>B</a:t>
-            </a:r>
-          </a:p>
-          <a:p>
-            <a:endParaRPr lang="en-US" sz="1600" dirty="0"/>
-          </a:p>
-        </p:txBody>
-      </p:sp>
-      <p:sp>
-        <p:nvSpPr>
-          <p:cNvPr id="21" name="TextBox 20"/>
-          <p:cNvSpPr txBox="1"/>
-          <p:nvPr/>
-        </p:nvSpPr>
-        <p:spPr>
-          <a:xfrm>
-            <a:off x="4521882" y="2403835"/>
-            <a:ext cx="373707" cy="584775"/>
-          </a:xfrm>
-          <a:prstGeom prst="rect">
-            <a:avLst/>
-          </a:prstGeom>
-          <a:noFill/>
-        </p:spPr>
-        <p:txBody>
-          <a:bodyPr wrap="square" rtlCol="0">
-            <a:spAutoFit/>
-          </a:bodyPr>
-          <a:lstStyle/>
-          <a:p>
-            <a:r>
-              <a:rPr lang="en-US" sz="1600" dirty="0" smtClean="0"/>
-              <a:t>C</a:t>
-            </a:r>
-          </a:p>
-          <a:p>
-            <a:endParaRPr lang="en-US" sz="1600" dirty="0"/>
-          </a:p>
-        </p:txBody>
-      </p:sp>
-      <p:sp>
-        <p:nvSpPr>
-          <p:cNvPr id="22" name="TextBox 21"/>
-          <p:cNvSpPr txBox="1"/>
-          <p:nvPr/>
-        </p:nvSpPr>
-        <p:spPr>
-          <a:xfrm>
-            <a:off x="3635338" y="1868094"/>
-            <a:ext cx="373707" cy="584775"/>
-          </a:xfrm>
-          <a:prstGeom prst="rect">
-            <a:avLst/>
-          </a:prstGeom>
-          <a:noFill/>
-        </p:spPr>
-        <p:txBody>
-          <a:bodyPr wrap="square" rtlCol="0">
-            <a:spAutoFit/>
-          </a:bodyPr>
-          <a:lstStyle/>
-          <a:p>
-            <a:r>
-              <a:rPr lang="en-US" sz="1600" dirty="0" smtClean="0"/>
-              <a:t>D</a:t>
-            </a:r>
-          </a:p>
-          <a:p>
-            <a:endParaRPr lang="en-US" sz="1600" dirty="0"/>
-          </a:p>
-        </p:txBody>
-      </p:sp>
-      <p:sp>
-        <p:nvSpPr>
-          <p:cNvPr id="17" name="TextBox 16"/>
-          <p:cNvSpPr txBox="1"/>
-          <p:nvPr/>
-        </p:nvSpPr>
-        <p:spPr>
-          <a:xfrm>
-            <a:off x="3619484" y="3933592"/>
-            <a:ext cx="373707" cy="584775"/>
-          </a:xfrm>
-          <a:prstGeom prst="rect">
-            <a:avLst/>
-          </a:prstGeom>
-          <a:noFill/>
-        </p:spPr>
-        <p:txBody>
-          <a:bodyPr wrap="square" rtlCol="0">
-            <a:spAutoFit/>
-          </a:bodyPr>
-          <a:lstStyle/>
-          <a:p>
-            <a:r>
-              <a:rPr lang="en-US" sz="1600" dirty="0" smtClean="0"/>
-              <a:t>A</a:t>
-            </a:r>
-          </a:p>
-          <a:p>
-            <a:endParaRPr lang="en-US" sz="1600" dirty="0"/>
-          </a:p>
-        </p:txBody>
-      </p:sp>
     </p:spTree>
     <p:extLst>
       <p:ext uri="{BB962C8B-B14F-4D97-AF65-F5344CB8AC3E}">
-        <p14:creationId xmlns:p14="http://schemas.microsoft.com/office/powerpoint/2010/main" val="2965276283"/>
+        <p14:creationId xmlns:p14="http://schemas.microsoft.com/office/powerpoint/2010/main" val="1094479932"/>
       </p:ext>
     </p:extLst>
   </p:cSld>

</xml_diff>